<commit_message>
made lots of changes I forgot to push
</commit_message>
<xml_diff>
--- a/Analysis/PSME_Plots/Presentation1.pptx
+++ b/Analysis/PSME_Plots/Presentation1.pptx
@@ -4,9 +4,12 @@
   <p:sldMasterIdLst>
     <p:sldMasterId id="2147483648" r:id="rId1"/>
   </p:sldMasterIdLst>
+  <p:notesMasterIdLst>
+    <p:notesMasterId r:id="rId4"/>
+  </p:notesMasterIdLst>
   <p:sldIdLst>
     <p:sldId id="256" r:id="rId2"/>
-    <p:sldId id="257" r:id="rId3"/>
+    <p:sldId id="258" r:id="rId3"/>
   </p:sldIdLst>
   <p:sldSz cx="12192000" cy="6858000"/>
   <p:notesSz cx="6858000" cy="9144000"/>
@@ -116,7 +119,7 @@
 <file path=ppt/revisionInfo.xml><?xml version="1.0" encoding="utf-8"?>
 <p1510:revInfo xmlns:a="http://schemas.openxmlformats.org/drawingml/2006/main" xmlns:r="http://schemas.openxmlformats.org/officeDocument/2006/relationships" xmlns:p1510="http://schemas.microsoft.com/office/powerpoint/2015/10/main">
   <p1510:revLst>
-    <p1510:client id="{DD4E4C7B-D585-494B-B384-783DAC332BED}" v="6" dt="2024-01-23T21:40:47.109"/>
+    <p1510:client id="{F3422DEB-6D8F-4738-A511-A3AFCDF5708E}" v="36" dt="2024-05-24T23:18:50.739"/>
   </p1510:revLst>
 </p1510:revInfo>
 </file>
@@ -171,7 +174,982 @@
       </pc:sldChg>
     </pc:docChg>
   </pc:docChgLst>
+  <pc:docChgLst>
+    <pc:chgData name="Deegan, Eva S" userId="ae3b14c2-f29a-4e9c-95fa-aa21238c8fd4" providerId="ADAL" clId="{F3422DEB-6D8F-4738-A511-A3AFCDF5708E}"/>
+    <pc:docChg chg="undo custSel addSld delSld modSld sldOrd">
+      <pc:chgData name="Deegan, Eva S" userId="ae3b14c2-f29a-4e9c-95fa-aa21238c8fd4" providerId="ADAL" clId="{F3422DEB-6D8F-4738-A511-A3AFCDF5708E}" dt="2024-05-24T23:18:50.739" v="259"/>
+      <pc:docMkLst>
+        <pc:docMk/>
+      </pc:docMkLst>
+      <pc:sldChg chg="addSp delSp modSp mod modTransition modNotesTx">
+        <pc:chgData name="Deegan, Eva S" userId="ae3b14c2-f29a-4e9c-95fa-aa21238c8fd4" providerId="ADAL" clId="{F3422DEB-6D8F-4738-A511-A3AFCDF5708E}" dt="2024-05-24T23:18:50.739" v="259"/>
+        <pc:sldMkLst>
+          <pc:docMk/>
+          <pc:sldMk cId="3069914526" sldId="256"/>
+        </pc:sldMkLst>
+        <pc:spChg chg="add del mod">
+          <ac:chgData name="Deegan, Eva S" userId="ae3b14c2-f29a-4e9c-95fa-aa21238c8fd4" providerId="ADAL" clId="{F3422DEB-6D8F-4738-A511-A3AFCDF5708E}" dt="2024-05-24T22:03:06.908" v="134" actId="478"/>
+          <ac:spMkLst>
+            <pc:docMk/>
+            <pc:sldMk cId="3069914526" sldId="256"/>
+            <ac:spMk id="2" creationId="{E54B2C48-B00D-D3D5-01B3-4C22F0FA1583}"/>
+          </ac:spMkLst>
+        </pc:spChg>
+        <pc:spChg chg="mod">
+          <ac:chgData name="Deegan, Eva S" userId="ae3b14c2-f29a-4e9c-95fa-aa21238c8fd4" providerId="ADAL" clId="{F3422DEB-6D8F-4738-A511-A3AFCDF5708E}" dt="2024-05-24T22:00:43.019" v="79" actId="20577"/>
+          <ac:spMkLst>
+            <pc:docMk/>
+            <pc:sldMk cId="3069914526" sldId="256"/>
+            <ac:spMk id="8" creationId="{0569955A-4275-4E47-C627-AB644F2EE6F1}"/>
+          </ac:spMkLst>
+        </pc:spChg>
+        <pc:spChg chg="mod">
+          <ac:chgData name="Deegan, Eva S" userId="ae3b14c2-f29a-4e9c-95fa-aa21238c8fd4" providerId="ADAL" clId="{F3422DEB-6D8F-4738-A511-A3AFCDF5708E}" dt="2024-05-24T22:00:41.961" v="77" actId="20577"/>
+          <ac:spMkLst>
+            <pc:docMk/>
+            <pc:sldMk cId="3069914526" sldId="256"/>
+            <ac:spMk id="9" creationId="{7B1B4A24-4887-8AB9-F810-3F113F742E50}"/>
+          </ac:spMkLst>
+        </pc:spChg>
+        <pc:picChg chg="mod">
+          <ac:chgData name="Deegan, Eva S" userId="ae3b14c2-f29a-4e9c-95fa-aa21238c8fd4" providerId="ADAL" clId="{F3422DEB-6D8F-4738-A511-A3AFCDF5708E}" dt="2024-05-24T21:57:58.618" v="64" actId="14826"/>
+          <ac:picMkLst>
+            <pc:docMk/>
+            <pc:sldMk cId="3069914526" sldId="256"/>
+            <ac:picMk id="5" creationId="{22982135-07CD-1E91-01C0-C6AB3B4B4FC8}"/>
+          </ac:picMkLst>
+        </pc:picChg>
+        <pc:picChg chg="add del mod">
+          <ac:chgData name="Deegan, Eva S" userId="ae3b14c2-f29a-4e9c-95fa-aa21238c8fd4" providerId="ADAL" clId="{F3422DEB-6D8F-4738-A511-A3AFCDF5708E}" dt="2024-05-24T22:03:40.347" v="138"/>
+          <ac:picMkLst>
+            <pc:docMk/>
+            <pc:sldMk cId="3069914526" sldId="256"/>
+            <ac:picMk id="37" creationId="{BAC0001E-9BFB-76EC-4497-701571B74D6B}"/>
+          </ac:picMkLst>
+        </pc:picChg>
+        <pc:picChg chg="add del mod">
+          <ac:chgData name="Deegan, Eva S" userId="ae3b14c2-f29a-4e9c-95fa-aa21238c8fd4" providerId="ADAL" clId="{F3422DEB-6D8F-4738-A511-A3AFCDF5708E}" dt="2024-05-24T22:03:52.392" v="143"/>
+          <ac:picMkLst>
+            <pc:docMk/>
+            <pc:sldMk cId="3069914526" sldId="256"/>
+            <ac:picMk id="38" creationId="{86C24918-F64E-C18B-4377-F9A2D7F1709B}"/>
+          </ac:picMkLst>
+        </pc:picChg>
+        <pc:picChg chg="add del mod">
+          <ac:chgData name="Deegan, Eva S" userId="ae3b14c2-f29a-4e9c-95fa-aa21238c8fd4" providerId="ADAL" clId="{F3422DEB-6D8F-4738-A511-A3AFCDF5708E}" dt="2024-05-24T22:04:26.614" v="155"/>
+          <ac:picMkLst>
+            <pc:docMk/>
+            <pc:sldMk cId="3069914526" sldId="256"/>
+            <ac:picMk id="40" creationId="{2D9101DD-DE75-E2F6-F435-066D9D001C7A}"/>
+          </ac:picMkLst>
+        </pc:picChg>
+        <pc:picChg chg="add del mod">
+          <ac:chgData name="Deegan, Eva S" userId="ae3b14c2-f29a-4e9c-95fa-aa21238c8fd4" providerId="ADAL" clId="{F3422DEB-6D8F-4738-A511-A3AFCDF5708E}" dt="2024-05-24T22:06:15.149" v="161"/>
+          <ac:picMkLst>
+            <pc:docMk/>
+            <pc:sldMk cId="3069914526" sldId="256"/>
+            <ac:picMk id="42" creationId="{D74E1AEB-1224-63C8-2313-C4AA8A5C2960}"/>
+          </ac:picMkLst>
+        </pc:picChg>
+        <pc:picChg chg="add del mod">
+          <ac:chgData name="Deegan, Eva S" userId="ae3b14c2-f29a-4e9c-95fa-aa21238c8fd4" providerId="ADAL" clId="{F3422DEB-6D8F-4738-A511-A3AFCDF5708E}" dt="2024-05-24T22:06:38.722" v="167"/>
+          <ac:picMkLst>
+            <pc:docMk/>
+            <pc:sldMk cId="3069914526" sldId="256"/>
+            <ac:picMk id="43" creationId="{8DFCF771-921D-37E7-012F-45515F42AE85}"/>
+          </ac:picMkLst>
+        </pc:picChg>
+      </pc:sldChg>
+      <pc:sldChg chg="addSp modSp del mod modTransition">
+        <pc:chgData name="Deegan, Eva S" userId="ae3b14c2-f29a-4e9c-95fa-aa21238c8fd4" providerId="ADAL" clId="{F3422DEB-6D8F-4738-A511-A3AFCDF5708E}" dt="2024-05-24T22:16:36.530" v="170" actId="2696"/>
+        <pc:sldMkLst>
+          <pc:docMk/>
+          <pc:sldMk cId="311310059" sldId="257"/>
+        </pc:sldMkLst>
+        <pc:spChg chg="add mod">
+          <ac:chgData name="Deegan, Eva S" userId="ae3b14c2-f29a-4e9c-95fa-aa21238c8fd4" providerId="ADAL" clId="{F3422DEB-6D8F-4738-A511-A3AFCDF5708E}" dt="2024-05-24T22:02:58.866" v="132"/>
+          <ac:spMkLst>
+            <pc:docMk/>
+            <pc:sldMk cId="311310059" sldId="257"/>
+            <ac:spMk id="4" creationId="{2665F024-FAC5-69B5-4F59-061224AFACB0}"/>
+          </ac:spMkLst>
+        </pc:spChg>
+        <pc:picChg chg="mod">
+          <ac:chgData name="Deegan, Eva S" userId="ae3b14c2-f29a-4e9c-95fa-aa21238c8fd4" providerId="ADAL" clId="{F3422DEB-6D8F-4738-A511-A3AFCDF5708E}" dt="2024-05-24T22:03:01.847" v="133" actId="1076"/>
+          <ac:picMkLst>
+            <pc:docMk/>
+            <pc:sldMk cId="311310059" sldId="257"/>
+            <ac:picMk id="5" creationId="{C2DBD93F-D168-792E-C84C-0A543A2773EA}"/>
+          </ac:picMkLst>
+        </pc:picChg>
+        <pc:picChg chg="add mod">
+          <ac:chgData name="Deegan, Eva S" userId="ae3b14c2-f29a-4e9c-95fa-aa21238c8fd4" providerId="ADAL" clId="{F3422DEB-6D8F-4738-A511-A3AFCDF5708E}" dt="2024-05-24T22:03:43.020" v="141" actId="34307"/>
+          <ac:picMkLst>
+            <pc:docMk/>
+            <pc:sldMk cId="311310059" sldId="257"/>
+            <ac:picMk id="11" creationId="{75ECBAA3-1C01-4FE3-AE65-E3CD39C1ECED}"/>
+          </ac:picMkLst>
+        </pc:picChg>
+      </pc:sldChg>
+      <pc:sldChg chg="addSp delSp modSp add mod modTransition modNotesTx">
+        <pc:chgData name="Deegan, Eva S" userId="ae3b14c2-f29a-4e9c-95fa-aa21238c8fd4" providerId="ADAL" clId="{F3422DEB-6D8F-4738-A511-A3AFCDF5708E}" dt="2024-05-24T23:18:50.739" v="259"/>
+        <pc:sldMkLst>
+          <pc:docMk/>
+          <pc:sldMk cId="1747748055" sldId="258"/>
+        </pc:sldMkLst>
+        <pc:spChg chg="add del">
+          <ac:chgData name="Deegan, Eva S" userId="ae3b14c2-f29a-4e9c-95fa-aa21238c8fd4" providerId="ADAL" clId="{F3422DEB-6D8F-4738-A511-A3AFCDF5708E}" dt="2024-05-24T22:02:56.273" v="131" actId="478"/>
+          <ac:spMkLst>
+            <pc:docMk/>
+            <pc:sldMk cId="1747748055" sldId="258"/>
+            <ac:spMk id="2" creationId="{E54B2C48-B00D-D3D5-01B3-4C22F0FA1583}"/>
+          </ac:spMkLst>
+        </pc:spChg>
+        <pc:spChg chg="mod">
+          <ac:chgData name="Deegan, Eva S" userId="ae3b14c2-f29a-4e9c-95fa-aa21238c8fd4" providerId="ADAL" clId="{F3422DEB-6D8F-4738-A511-A3AFCDF5708E}" dt="2024-05-24T23:08:19.800" v="195" actId="20577"/>
+          <ac:spMkLst>
+            <pc:docMk/>
+            <pc:sldMk cId="1747748055" sldId="258"/>
+            <ac:spMk id="6" creationId="{29D2CA35-6322-94C8-E65D-12B7682DBD59}"/>
+          </ac:spMkLst>
+        </pc:spChg>
+        <pc:spChg chg="mod">
+          <ac:chgData name="Deegan, Eva S" userId="ae3b14c2-f29a-4e9c-95fa-aa21238c8fd4" providerId="ADAL" clId="{F3422DEB-6D8F-4738-A511-A3AFCDF5708E}" dt="2024-05-24T23:08:48.430" v="213" actId="20577"/>
+          <ac:spMkLst>
+            <pc:docMk/>
+            <pc:sldMk cId="1747748055" sldId="258"/>
+            <ac:spMk id="7" creationId="{78E9559A-00BC-8676-BF6F-F1447FE1F967}"/>
+          </ac:spMkLst>
+        </pc:spChg>
+        <pc:spChg chg="mod">
+          <ac:chgData name="Deegan, Eva S" userId="ae3b14c2-f29a-4e9c-95fa-aa21238c8fd4" providerId="ADAL" clId="{F3422DEB-6D8F-4738-A511-A3AFCDF5708E}" dt="2024-05-24T23:09:09.385" v="221" actId="20577"/>
+          <ac:spMkLst>
+            <pc:docMk/>
+            <pc:sldMk cId="1747748055" sldId="258"/>
+            <ac:spMk id="8" creationId="{0569955A-4275-4E47-C627-AB644F2EE6F1}"/>
+          </ac:spMkLst>
+        </pc:spChg>
+        <pc:spChg chg="mod">
+          <ac:chgData name="Deegan, Eva S" userId="ae3b14c2-f29a-4e9c-95fa-aa21238c8fd4" providerId="ADAL" clId="{F3422DEB-6D8F-4738-A511-A3AFCDF5708E}" dt="2024-05-24T23:09:34.930" v="228" actId="20577"/>
+          <ac:spMkLst>
+            <pc:docMk/>
+            <pc:sldMk cId="1747748055" sldId="258"/>
+            <ac:spMk id="9" creationId="{7B1B4A24-4887-8AB9-F810-3F113F742E50}"/>
+          </ac:spMkLst>
+        </pc:spChg>
+        <pc:spChg chg="mod">
+          <ac:chgData name="Deegan, Eva S" userId="ae3b14c2-f29a-4e9c-95fa-aa21238c8fd4" providerId="ADAL" clId="{F3422DEB-6D8F-4738-A511-A3AFCDF5708E}" dt="2024-05-24T23:09:51.989" v="235" actId="20577"/>
+          <ac:spMkLst>
+            <pc:docMk/>
+            <pc:sldMk cId="1747748055" sldId="258"/>
+            <ac:spMk id="10" creationId="{459B017E-95F6-9AFB-7871-5E69886B1CC2}"/>
+          </ac:spMkLst>
+        </pc:spChg>
+        <pc:spChg chg="mod">
+          <ac:chgData name="Deegan, Eva S" userId="ae3b14c2-f29a-4e9c-95fa-aa21238c8fd4" providerId="ADAL" clId="{F3422DEB-6D8F-4738-A511-A3AFCDF5708E}" dt="2024-05-24T23:10:06.350" v="242" actId="20577"/>
+          <ac:spMkLst>
+            <pc:docMk/>
+            <pc:sldMk cId="1747748055" sldId="258"/>
+            <ac:spMk id="11" creationId="{201F2199-3E42-4905-E3DA-E1E8A00051C8}"/>
+          </ac:spMkLst>
+        </pc:spChg>
+        <pc:spChg chg="mod">
+          <ac:chgData name="Deegan, Eva S" userId="ae3b14c2-f29a-4e9c-95fa-aa21238c8fd4" providerId="ADAL" clId="{F3422DEB-6D8F-4738-A511-A3AFCDF5708E}" dt="2024-05-24T23:10:28.876" v="249" actId="20577"/>
+          <ac:spMkLst>
+            <pc:docMk/>
+            <pc:sldMk cId="1747748055" sldId="258"/>
+            <ac:spMk id="12" creationId="{FAE510AA-7A69-9503-E457-265764C0229C}"/>
+          </ac:spMkLst>
+        </pc:spChg>
+        <pc:spChg chg="mod">
+          <ac:chgData name="Deegan, Eva S" userId="ae3b14c2-f29a-4e9c-95fa-aa21238c8fd4" providerId="ADAL" clId="{F3422DEB-6D8F-4738-A511-A3AFCDF5708E}" dt="2024-05-24T23:10:50.885" v="255" actId="20577"/>
+          <ac:spMkLst>
+            <pc:docMk/>
+            <pc:sldMk cId="1747748055" sldId="258"/>
+            <ac:spMk id="13" creationId="{53EB426C-F330-4403-076B-D5794692E239}"/>
+          </ac:spMkLst>
+        </pc:spChg>
+        <pc:spChg chg="mod">
+          <ac:chgData name="Deegan, Eva S" userId="ae3b14c2-f29a-4e9c-95fa-aa21238c8fd4" providerId="ADAL" clId="{F3422DEB-6D8F-4738-A511-A3AFCDF5708E}" dt="2024-05-24T23:08:15.646" v="193" actId="20577"/>
+          <ac:spMkLst>
+            <pc:docMk/>
+            <pc:sldMk cId="1747748055" sldId="258"/>
+            <ac:spMk id="14" creationId="{AC3AB16B-9817-9D08-D2F6-CEB52CD56E3D}"/>
+          </ac:spMkLst>
+        </pc:spChg>
+        <pc:spChg chg="mod">
+          <ac:chgData name="Deegan, Eva S" userId="ae3b14c2-f29a-4e9c-95fa-aa21238c8fd4" providerId="ADAL" clId="{F3422DEB-6D8F-4738-A511-A3AFCDF5708E}" dt="2024-05-24T23:08:37.517" v="207" actId="20577"/>
+          <ac:spMkLst>
+            <pc:docMk/>
+            <pc:sldMk cId="1747748055" sldId="258"/>
+            <ac:spMk id="15" creationId="{61A93925-B8C8-1A4C-DA08-B30CC58C06DA}"/>
+          </ac:spMkLst>
+        </pc:spChg>
+        <pc:spChg chg="mod">
+          <ac:chgData name="Deegan, Eva S" userId="ae3b14c2-f29a-4e9c-95fa-aa21238c8fd4" providerId="ADAL" clId="{F3422DEB-6D8F-4738-A511-A3AFCDF5708E}" dt="2024-05-24T23:09:04.569" v="219" actId="20577"/>
+          <ac:spMkLst>
+            <pc:docMk/>
+            <pc:sldMk cId="1747748055" sldId="258"/>
+            <ac:spMk id="16" creationId="{4CBD9A7D-402B-AFC4-7C08-2A5F5A63CE00}"/>
+          </ac:spMkLst>
+        </pc:spChg>
+        <pc:spChg chg="mod">
+          <ac:chgData name="Deegan, Eva S" userId="ae3b14c2-f29a-4e9c-95fa-aa21238c8fd4" providerId="ADAL" clId="{F3422DEB-6D8F-4738-A511-A3AFCDF5708E}" dt="2024-05-24T23:09:26.463" v="226" actId="20577"/>
+          <ac:spMkLst>
+            <pc:docMk/>
+            <pc:sldMk cId="1747748055" sldId="258"/>
+            <ac:spMk id="17" creationId="{6F7E0A08-AA3A-D65B-4CE9-EB94FA64E5B8}"/>
+          </ac:spMkLst>
+        </pc:spChg>
+        <pc:spChg chg="mod">
+          <ac:chgData name="Deegan, Eva S" userId="ae3b14c2-f29a-4e9c-95fa-aa21238c8fd4" providerId="ADAL" clId="{F3422DEB-6D8F-4738-A511-A3AFCDF5708E}" dt="2024-05-24T23:09:47.131" v="233" actId="20577"/>
+          <ac:spMkLst>
+            <pc:docMk/>
+            <pc:sldMk cId="1747748055" sldId="258"/>
+            <ac:spMk id="18" creationId="{43A96966-4E69-EC5F-308A-FFD2A1609FFB}"/>
+          </ac:spMkLst>
+        </pc:spChg>
+        <pc:spChg chg="mod">
+          <ac:chgData name="Deegan, Eva S" userId="ae3b14c2-f29a-4e9c-95fa-aa21238c8fd4" providerId="ADAL" clId="{F3422DEB-6D8F-4738-A511-A3AFCDF5708E}" dt="2024-05-24T23:10:02.106" v="240" actId="20577"/>
+          <ac:spMkLst>
+            <pc:docMk/>
+            <pc:sldMk cId="1747748055" sldId="258"/>
+            <ac:spMk id="19" creationId="{06A6B925-BCEB-3CA7-B367-271F2C003B1C}"/>
+          </ac:spMkLst>
+        </pc:spChg>
+        <pc:spChg chg="mod">
+          <ac:chgData name="Deegan, Eva S" userId="ae3b14c2-f29a-4e9c-95fa-aa21238c8fd4" providerId="ADAL" clId="{F3422DEB-6D8F-4738-A511-A3AFCDF5708E}" dt="2024-05-24T23:10:21.541" v="247" actId="20577"/>
+          <ac:spMkLst>
+            <pc:docMk/>
+            <pc:sldMk cId="1747748055" sldId="258"/>
+            <ac:spMk id="20" creationId="{EAAC82DB-063B-C2CE-CF93-7A43A7D4FFAB}"/>
+          </ac:spMkLst>
+        </pc:spChg>
+        <pc:spChg chg="mod">
+          <ac:chgData name="Deegan, Eva S" userId="ae3b14c2-f29a-4e9c-95fa-aa21238c8fd4" providerId="ADAL" clId="{F3422DEB-6D8F-4738-A511-A3AFCDF5708E}" dt="2024-05-24T23:10:43.754" v="253" actId="20577"/>
+          <ac:spMkLst>
+            <pc:docMk/>
+            <pc:sldMk cId="1747748055" sldId="258"/>
+            <ac:spMk id="21" creationId="{074F1832-A810-84D7-F0AC-FC026D0F38A9}"/>
+          </ac:spMkLst>
+        </pc:spChg>
+        <pc:spChg chg="mod">
+          <ac:chgData name="Deegan, Eva S" userId="ae3b14c2-f29a-4e9c-95fa-aa21238c8fd4" providerId="ADAL" clId="{F3422DEB-6D8F-4738-A511-A3AFCDF5708E}" dt="2024-05-24T23:08:28.484" v="204" actId="20577"/>
+          <ac:spMkLst>
+            <pc:docMk/>
+            <pc:sldMk cId="1747748055" sldId="258"/>
+            <ac:spMk id="22" creationId="{01F65EAB-1546-5DD6-CDF7-F62B145B2EFA}"/>
+          </ac:spMkLst>
+        </pc:spChg>
+        <pc:spChg chg="mod">
+          <ac:chgData name="Deegan, Eva S" userId="ae3b14c2-f29a-4e9c-95fa-aa21238c8fd4" providerId="ADAL" clId="{F3422DEB-6D8F-4738-A511-A3AFCDF5708E}" dt="2024-05-24T23:08:54.343" v="216" actId="20577"/>
+          <ac:spMkLst>
+            <pc:docMk/>
+            <pc:sldMk cId="1747748055" sldId="258"/>
+            <ac:spMk id="23" creationId="{63B04B1E-6C50-7C62-DAFA-AC6766F29058}"/>
+          </ac:spMkLst>
+        </pc:spChg>
+        <pc:spChg chg="mod">
+          <ac:chgData name="Deegan, Eva S" userId="ae3b14c2-f29a-4e9c-95fa-aa21238c8fd4" providerId="ADAL" clId="{F3422DEB-6D8F-4738-A511-A3AFCDF5708E}" dt="2024-05-24T23:09:18.961" v="224" actId="20577"/>
+          <ac:spMkLst>
+            <pc:docMk/>
+            <pc:sldMk cId="1747748055" sldId="258"/>
+            <ac:spMk id="24" creationId="{5916DF85-646B-8EE3-4840-F30683980463}"/>
+          </ac:spMkLst>
+        </pc:spChg>
+        <pc:spChg chg="mod">
+          <ac:chgData name="Deegan, Eva S" userId="ae3b14c2-f29a-4e9c-95fa-aa21238c8fd4" providerId="ADAL" clId="{F3422DEB-6D8F-4738-A511-A3AFCDF5708E}" dt="2024-05-24T23:09:42.681" v="231" actId="20577"/>
+          <ac:spMkLst>
+            <pc:docMk/>
+            <pc:sldMk cId="1747748055" sldId="258"/>
+            <ac:spMk id="25" creationId="{436E1FAB-AA1C-114B-5687-2043C48A03E5}"/>
+          </ac:spMkLst>
+        </pc:spChg>
+        <pc:spChg chg="mod">
+          <ac:chgData name="Deegan, Eva S" userId="ae3b14c2-f29a-4e9c-95fa-aa21238c8fd4" providerId="ADAL" clId="{F3422DEB-6D8F-4738-A511-A3AFCDF5708E}" dt="2024-05-24T23:09:56.926" v="238" actId="20577"/>
+          <ac:spMkLst>
+            <pc:docMk/>
+            <pc:sldMk cId="1747748055" sldId="258"/>
+            <ac:spMk id="26" creationId="{23CBE8A1-2589-EAFB-62D0-BFD7816E52D9}"/>
+          </ac:spMkLst>
+        </pc:spChg>
+        <pc:spChg chg="mod">
+          <ac:chgData name="Deegan, Eva S" userId="ae3b14c2-f29a-4e9c-95fa-aa21238c8fd4" providerId="ADAL" clId="{F3422DEB-6D8F-4738-A511-A3AFCDF5708E}" dt="2024-05-24T23:10:13.399" v="245" actId="20577"/>
+          <ac:spMkLst>
+            <pc:docMk/>
+            <pc:sldMk cId="1747748055" sldId="258"/>
+            <ac:spMk id="27" creationId="{36D0264A-AEEF-1488-AE73-68F31521CBB7}"/>
+          </ac:spMkLst>
+        </pc:spChg>
+        <pc:spChg chg="mod">
+          <ac:chgData name="Deegan, Eva S" userId="ae3b14c2-f29a-4e9c-95fa-aa21238c8fd4" providerId="ADAL" clId="{F3422DEB-6D8F-4738-A511-A3AFCDF5708E}" dt="2024-05-24T23:10:33.699" v="251" actId="20577"/>
+          <ac:spMkLst>
+            <pc:docMk/>
+            <pc:sldMk cId="1747748055" sldId="258"/>
+            <ac:spMk id="28" creationId="{19A90873-B20A-E299-3069-585929A4FF0C}"/>
+          </ac:spMkLst>
+        </pc:spChg>
+        <pc:spChg chg="mod">
+          <ac:chgData name="Deegan, Eva S" userId="ae3b14c2-f29a-4e9c-95fa-aa21238c8fd4" providerId="ADAL" clId="{F3422DEB-6D8F-4738-A511-A3AFCDF5708E}" dt="2024-05-24T23:12:07.609" v="258" actId="20577"/>
+          <ac:spMkLst>
+            <pc:docMk/>
+            <pc:sldMk cId="1747748055" sldId="258"/>
+            <ac:spMk id="29" creationId="{F74D25BD-2990-55D2-9AAB-C347E3F6E190}"/>
+          </ac:spMkLst>
+        </pc:spChg>
+        <pc:spChg chg="mod">
+          <ac:chgData name="Deegan, Eva S" userId="ae3b14c2-f29a-4e9c-95fa-aa21238c8fd4" providerId="ADAL" clId="{F3422DEB-6D8F-4738-A511-A3AFCDF5708E}" dt="2024-05-24T23:07:44.635" v="186" actId="20577"/>
+          <ac:spMkLst>
+            <pc:docMk/>
+            <pc:sldMk cId="1747748055" sldId="258"/>
+            <ac:spMk id="32" creationId="{EC7C5D21-5C72-9688-7FC2-DD6DFB0D69E2}"/>
+          </ac:spMkLst>
+        </pc:spChg>
+        <pc:spChg chg="add del mod">
+          <ac:chgData name="Deegan, Eva S" userId="ae3b14c2-f29a-4e9c-95fa-aa21238c8fd4" providerId="ADAL" clId="{F3422DEB-6D8F-4738-A511-A3AFCDF5708E}" dt="2024-05-24T22:02:50.040" v="129" actId="478"/>
+          <ac:spMkLst>
+            <pc:docMk/>
+            <pc:sldMk cId="1747748055" sldId="258"/>
+            <ac:spMk id="35" creationId="{D0C5978A-541F-597E-741E-D4CB43572C5F}"/>
+          </ac:spMkLst>
+        </pc:spChg>
+        <pc:picChg chg="mod">
+          <ac:chgData name="Deegan, Eva S" userId="ae3b14c2-f29a-4e9c-95fa-aa21238c8fd4" providerId="ADAL" clId="{F3422DEB-6D8F-4738-A511-A3AFCDF5708E}" dt="2024-05-24T21:58:17.100" v="66" actId="14826"/>
+          <ac:picMkLst>
+            <pc:docMk/>
+            <pc:sldMk cId="1747748055" sldId="258"/>
+            <ac:picMk id="5" creationId="{22982135-07CD-1E91-01C0-C6AB3B4B4FC8}"/>
+          </ac:picMkLst>
+        </pc:picChg>
+        <pc:picChg chg="add del mod">
+          <ac:chgData name="Deegan, Eva S" userId="ae3b14c2-f29a-4e9c-95fa-aa21238c8fd4" providerId="ADAL" clId="{F3422DEB-6D8F-4738-A511-A3AFCDF5708E}" dt="2024-05-24T22:03:40.347" v="138"/>
+          <ac:picMkLst>
+            <pc:docMk/>
+            <pc:sldMk cId="1747748055" sldId="258"/>
+            <ac:picMk id="37" creationId="{B09CE697-68C2-7525-85D6-64C106B8EF04}"/>
+          </ac:picMkLst>
+        </pc:picChg>
+        <pc:picChg chg="add del mod">
+          <ac:chgData name="Deegan, Eva S" userId="ae3b14c2-f29a-4e9c-95fa-aa21238c8fd4" providerId="ADAL" clId="{F3422DEB-6D8F-4738-A511-A3AFCDF5708E}" dt="2024-05-24T22:03:52.392" v="143"/>
+          <ac:picMkLst>
+            <pc:docMk/>
+            <pc:sldMk cId="1747748055" sldId="258"/>
+            <ac:picMk id="38" creationId="{BC6E3D99-8540-B4A2-EB60-2598434C7D24}"/>
+          </ac:picMkLst>
+        </pc:picChg>
+        <pc:picChg chg="add del mod">
+          <ac:chgData name="Deegan, Eva S" userId="ae3b14c2-f29a-4e9c-95fa-aa21238c8fd4" providerId="ADAL" clId="{F3422DEB-6D8F-4738-A511-A3AFCDF5708E}" dt="2024-05-24T22:04:26.614" v="155"/>
+          <ac:picMkLst>
+            <pc:docMk/>
+            <pc:sldMk cId="1747748055" sldId="258"/>
+            <ac:picMk id="42" creationId="{6B0E15A7-53B4-AFE6-391B-FC5C1C706074}"/>
+          </ac:picMkLst>
+        </pc:picChg>
+        <pc:picChg chg="add del mod">
+          <ac:chgData name="Deegan, Eva S" userId="ae3b14c2-f29a-4e9c-95fa-aa21238c8fd4" providerId="ADAL" clId="{F3422DEB-6D8F-4738-A511-A3AFCDF5708E}" dt="2024-05-24T22:06:15.149" v="161"/>
+          <ac:picMkLst>
+            <pc:docMk/>
+            <pc:sldMk cId="1747748055" sldId="258"/>
+            <ac:picMk id="44" creationId="{CB71D267-3992-AA80-3179-45C33D9C46C4}"/>
+          </ac:picMkLst>
+        </pc:picChg>
+        <pc:picChg chg="add del mod">
+          <ac:chgData name="Deegan, Eva S" userId="ae3b14c2-f29a-4e9c-95fa-aa21238c8fd4" providerId="ADAL" clId="{F3422DEB-6D8F-4738-A511-A3AFCDF5708E}" dt="2024-05-24T22:06:38.722" v="167"/>
+          <ac:picMkLst>
+            <pc:docMk/>
+            <pc:sldMk cId="1747748055" sldId="258"/>
+            <ac:picMk id="45" creationId="{A4BB74C0-B296-E307-23AF-E37D8D3EDBD8}"/>
+          </ac:picMkLst>
+        </pc:picChg>
+      </pc:sldChg>
+      <pc:sldChg chg="addSp delSp modSp add del mod ord modTransition">
+        <pc:chgData name="Deegan, Eva S" userId="ae3b14c2-f29a-4e9c-95fa-aa21238c8fd4" providerId="ADAL" clId="{F3422DEB-6D8F-4738-A511-A3AFCDF5708E}" dt="2024-05-24T22:16:14.091" v="168" actId="2696"/>
+        <pc:sldMkLst>
+          <pc:docMk/>
+          <pc:sldMk cId="1465809095" sldId="259"/>
+        </pc:sldMkLst>
+        <pc:picChg chg="add del mod">
+          <ac:chgData name="Deegan, Eva S" userId="ae3b14c2-f29a-4e9c-95fa-aa21238c8fd4" providerId="ADAL" clId="{F3422DEB-6D8F-4738-A511-A3AFCDF5708E}" dt="2024-05-24T22:04:26.614" v="155"/>
+          <ac:picMkLst>
+            <pc:docMk/>
+            <pc:sldMk cId="1465809095" sldId="259"/>
+            <ac:picMk id="2" creationId="{00363ACD-BEEA-A01A-8E4F-D29D80E4EB21}"/>
+          </ac:picMkLst>
+        </pc:picChg>
+        <pc:picChg chg="add del mod">
+          <ac:chgData name="Deegan, Eva S" userId="ae3b14c2-f29a-4e9c-95fa-aa21238c8fd4" providerId="ADAL" clId="{F3422DEB-6D8F-4738-A511-A3AFCDF5708E}" dt="2024-05-24T22:06:15.149" v="161"/>
+          <ac:picMkLst>
+            <pc:docMk/>
+            <pc:sldMk cId="1465809095" sldId="259"/>
+            <ac:picMk id="3" creationId="{E0B60702-CC42-67BF-F1EE-DB98F7543C43}"/>
+          </ac:picMkLst>
+        </pc:picChg>
+        <pc:picChg chg="add del mod">
+          <ac:chgData name="Deegan, Eva S" userId="ae3b14c2-f29a-4e9c-95fa-aa21238c8fd4" providerId="ADAL" clId="{F3422DEB-6D8F-4738-A511-A3AFCDF5708E}" dt="2024-05-24T22:06:38.722" v="167"/>
+          <ac:picMkLst>
+            <pc:docMk/>
+            <pc:sldMk cId="1465809095" sldId="259"/>
+            <ac:picMk id="4" creationId="{BAB987DB-6DD1-67C9-954F-549BE8D3D759}"/>
+          </ac:picMkLst>
+        </pc:picChg>
+      </pc:sldChg>
+      <pc:sldChg chg="addSp delSp modSp add del mod ord modTransition">
+        <pc:chgData name="Deegan, Eva S" userId="ae3b14c2-f29a-4e9c-95fa-aa21238c8fd4" providerId="ADAL" clId="{F3422DEB-6D8F-4738-A511-A3AFCDF5708E}" dt="2024-05-24T22:16:16.374" v="169" actId="2696"/>
+        <pc:sldMkLst>
+          <pc:docMk/>
+          <pc:sldMk cId="340874196" sldId="260"/>
+        </pc:sldMkLst>
+        <pc:picChg chg="add del mod">
+          <ac:chgData name="Deegan, Eva S" userId="ae3b14c2-f29a-4e9c-95fa-aa21238c8fd4" providerId="ADAL" clId="{F3422DEB-6D8F-4738-A511-A3AFCDF5708E}" dt="2024-05-24T22:04:26.614" v="155"/>
+          <ac:picMkLst>
+            <pc:docMk/>
+            <pc:sldMk cId="340874196" sldId="260"/>
+            <ac:picMk id="2" creationId="{E113EAFA-C4B3-2D8E-E706-80DBFD6C810E}"/>
+          </ac:picMkLst>
+        </pc:picChg>
+        <pc:picChg chg="add del mod">
+          <ac:chgData name="Deegan, Eva S" userId="ae3b14c2-f29a-4e9c-95fa-aa21238c8fd4" providerId="ADAL" clId="{F3422DEB-6D8F-4738-A511-A3AFCDF5708E}" dt="2024-05-24T22:06:15.149" v="161"/>
+          <ac:picMkLst>
+            <pc:docMk/>
+            <pc:sldMk cId="340874196" sldId="260"/>
+            <ac:picMk id="30" creationId="{E9056914-3D45-6847-1213-4689C77A1417}"/>
+          </ac:picMkLst>
+        </pc:picChg>
+        <pc:picChg chg="add del mod">
+          <ac:chgData name="Deegan, Eva S" userId="ae3b14c2-f29a-4e9c-95fa-aa21238c8fd4" providerId="ADAL" clId="{F3422DEB-6D8F-4738-A511-A3AFCDF5708E}" dt="2024-05-24T22:06:38.722" v="167"/>
+          <ac:picMkLst>
+            <pc:docMk/>
+            <pc:sldMk cId="340874196" sldId="260"/>
+            <ac:picMk id="37" creationId="{C9EC417F-F5F8-6A59-2BB4-8EB0D8E4AB57}"/>
+          </ac:picMkLst>
+        </pc:picChg>
+      </pc:sldChg>
+    </pc:docChg>
+  </pc:docChgLst>
 </pc:chgInfo>
+</file>
+
+<file path=ppt/notesMasters/notesMaster1.xml><?xml version="1.0" encoding="utf-8"?>
+<p:notesMaster xmlns:a="http://schemas.openxmlformats.org/drawingml/2006/main" xmlns:r="http://schemas.openxmlformats.org/officeDocument/2006/relationships" xmlns:p="http://schemas.openxmlformats.org/presentationml/2006/main">
+  <p:cSld>
+    <p:bg>
+      <p:bgRef idx="1001">
+        <a:schemeClr val="bg1"/>
+      </p:bgRef>
+    </p:bg>
+    <p:spTree>
+      <p:nvGrpSpPr>
+        <p:cNvPr id="1" name=""/>
+        <p:cNvGrpSpPr/>
+        <p:nvPr/>
+      </p:nvGrpSpPr>
+      <p:grpSpPr>
+        <a:xfrm>
+          <a:off x="0" y="0"/>
+          <a:ext cx="0" cy="0"/>
+          <a:chOff x="0" y="0"/>
+          <a:chExt cx="0" cy="0"/>
+        </a:xfrm>
+      </p:grpSpPr>
+      <p:sp>
+        <p:nvSpPr>
+          <p:cNvPr id="2" name="Header Placeholder 1"/>
+          <p:cNvSpPr>
+            <a:spLocks noGrp="1"/>
+          </p:cNvSpPr>
+          <p:nvPr>
+            <p:ph type="hdr" sz="quarter"/>
+          </p:nvPr>
+        </p:nvSpPr>
+        <p:spPr>
+          <a:xfrm>
+            <a:off x="0" y="0"/>
+            <a:ext cx="2971800" cy="458788"/>
+          </a:xfrm>
+          <a:prstGeom prst="rect">
+            <a:avLst/>
+          </a:prstGeom>
+        </p:spPr>
+        <p:txBody>
+          <a:bodyPr vert="horz" lIns="91440" tIns="45720" rIns="91440" bIns="45720" rtlCol="0"/>
+          <a:lstStyle>
+            <a:lvl1pPr algn="l">
+              <a:defRPr sz="1200"/>
+            </a:lvl1pPr>
+          </a:lstStyle>
+          <a:p>
+            <a:endParaRPr lang="en-US"/>
+          </a:p>
+        </p:txBody>
+      </p:sp>
+      <p:sp>
+        <p:nvSpPr>
+          <p:cNvPr id="3" name="Date Placeholder 2"/>
+          <p:cNvSpPr>
+            <a:spLocks noGrp="1"/>
+          </p:cNvSpPr>
+          <p:nvPr>
+            <p:ph type="dt" idx="1"/>
+          </p:nvPr>
+        </p:nvSpPr>
+        <p:spPr>
+          <a:xfrm>
+            <a:off x="3884613" y="0"/>
+            <a:ext cx="2971800" cy="458788"/>
+          </a:xfrm>
+          <a:prstGeom prst="rect">
+            <a:avLst/>
+          </a:prstGeom>
+        </p:spPr>
+        <p:txBody>
+          <a:bodyPr vert="horz" lIns="91440" tIns="45720" rIns="91440" bIns="45720" rtlCol="0"/>
+          <a:lstStyle>
+            <a:lvl1pPr algn="r">
+              <a:defRPr sz="1200"/>
+            </a:lvl1pPr>
+          </a:lstStyle>
+          <a:p>
+            <a:fld id="{C61AEEE9-9F64-4F78-B32F-FECBCCEB864F}" type="datetimeFigureOut">
+              <a:rPr lang="en-US" smtClean="0"/>
+              <a:t>5/24/2024</a:t>
+            </a:fld>
+            <a:endParaRPr lang="en-US"/>
+          </a:p>
+        </p:txBody>
+      </p:sp>
+      <p:sp>
+        <p:nvSpPr>
+          <p:cNvPr id="4" name="Slide Image Placeholder 3"/>
+          <p:cNvSpPr>
+            <a:spLocks noGrp="1" noRot="1" noChangeAspect="1"/>
+          </p:cNvSpPr>
+          <p:nvPr>
+            <p:ph type="sldImg" idx="2"/>
+          </p:nvPr>
+        </p:nvSpPr>
+        <p:spPr>
+          <a:xfrm>
+            <a:off x="685800" y="1143000"/>
+            <a:ext cx="5486400" cy="3086100"/>
+          </a:xfrm>
+          <a:prstGeom prst="rect">
+            <a:avLst/>
+          </a:prstGeom>
+          <a:noFill/>
+          <a:ln w="12700">
+            <a:solidFill>
+              <a:prstClr val="black"/>
+            </a:solidFill>
+          </a:ln>
+        </p:spPr>
+        <p:txBody>
+          <a:bodyPr vert="horz" lIns="91440" tIns="45720" rIns="91440" bIns="45720" rtlCol="0" anchor="ctr"/>
+          <a:lstStyle/>
+          <a:p>
+            <a:endParaRPr lang="en-US"/>
+          </a:p>
+        </p:txBody>
+      </p:sp>
+      <p:sp>
+        <p:nvSpPr>
+          <p:cNvPr id="5" name="Notes Placeholder 4"/>
+          <p:cNvSpPr>
+            <a:spLocks noGrp="1"/>
+          </p:cNvSpPr>
+          <p:nvPr>
+            <p:ph type="body" sz="quarter" idx="3"/>
+          </p:nvPr>
+        </p:nvSpPr>
+        <p:spPr>
+          <a:xfrm>
+            <a:off x="685800" y="4400550"/>
+            <a:ext cx="5486400" cy="3600450"/>
+          </a:xfrm>
+          <a:prstGeom prst="rect">
+            <a:avLst/>
+          </a:prstGeom>
+        </p:spPr>
+        <p:txBody>
+          <a:bodyPr vert="horz" lIns="91440" tIns="45720" rIns="91440" bIns="45720" rtlCol="0"/>
+          <a:lstStyle/>
+          <a:p>
+            <a:pPr lvl="0"/>
+            <a:r>
+              <a:rPr lang="en-US"/>
+              <a:t>Click to edit Master text styles</a:t>
+            </a:r>
+          </a:p>
+          <a:p>
+            <a:pPr lvl="1"/>
+            <a:r>
+              <a:rPr lang="en-US"/>
+              <a:t>Second level</a:t>
+            </a:r>
+          </a:p>
+          <a:p>
+            <a:pPr lvl="2"/>
+            <a:r>
+              <a:rPr lang="en-US"/>
+              <a:t>Third level</a:t>
+            </a:r>
+          </a:p>
+          <a:p>
+            <a:pPr lvl="3"/>
+            <a:r>
+              <a:rPr lang="en-US"/>
+              <a:t>Fourth level</a:t>
+            </a:r>
+          </a:p>
+          <a:p>
+            <a:pPr lvl="4"/>
+            <a:r>
+              <a:rPr lang="en-US"/>
+              <a:t>Fifth level</a:t>
+            </a:r>
+          </a:p>
+        </p:txBody>
+      </p:sp>
+      <p:sp>
+        <p:nvSpPr>
+          <p:cNvPr id="6" name="Footer Placeholder 5"/>
+          <p:cNvSpPr>
+            <a:spLocks noGrp="1"/>
+          </p:cNvSpPr>
+          <p:nvPr>
+            <p:ph type="ftr" sz="quarter" idx="4"/>
+          </p:nvPr>
+        </p:nvSpPr>
+        <p:spPr>
+          <a:xfrm>
+            <a:off x="0" y="8685213"/>
+            <a:ext cx="2971800" cy="458787"/>
+          </a:xfrm>
+          <a:prstGeom prst="rect">
+            <a:avLst/>
+          </a:prstGeom>
+        </p:spPr>
+        <p:txBody>
+          <a:bodyPr vert="horz" lIns="91440" tIns="45720" rIns="91440" bIns="45720" rtlCol="0" anchor="b"/>
+          <a:lstStyle>
+            <a:lvl1pPr algn="l">
+              <a:defRPr sz="1200"/>
+            </a:lvl1pPr>
+          </a:lstStyle>
+          <a:p>
+            <a:endParaRPr lang="en-US"/>
+          </a:p>
+        </p:txBody>
+      </p:sp>
+      <p:sp>
+        <p:nvSpPr>
+          <p:cNvPr id="7" name="Slide Number Placeholder 6"/>
+          <p:cNvSpPr>
+            <a:spLocks noGrp="1"/>
+          </p:cNvSpPr>
+          <p:nvPr>
+            <p:ph type="sldNum" sz="quarter" idx="5"/>
+          </p:nvPr>
+        </p:nvSpPr>
+        <p:spPr>
+          <a:xfrm>
+            <a:off x="3884613" y="8685213"/>
+            <a:ext cx="2971800" cy="458787"/>
+          </a:xfrm>
+          <a:prstGeom prst="rect">
+            <a:avLst/>
+          </a:prstGeom>
+        </p:spPr>
+        <p:txBody>
+          <a:bodyPr vert="horz" lIns="91440" tIns="45720" rIns="91440" bIns="45720" rtlCol="0" anchor="b"/>
+          <a:lstStyle>
+            <a:lvl1pPr algn="r">
+              <a:defRPr sz="1200"/>
+            </a:lvl1pPr>
+          </a:lstStyle>
+          <a:p>
+            <a:fld id="{5F7CED12-39B8-4FD8-B63C-C8AA8B7BCE9F}" type="slidenum">
+              <a:rPr lang="en-US" smtClean="0"/>
+              <a:t>‹#›</a:t>
+            </a:fld>
+            <a:endParaRPr lang="en-US"/>
+          </a:p>
+        </p:txBody>
+      </p:sp>
+    </p:spTree>
+    <p:extLst>
+      <p:ext uri="{BB962C8B-B14F-4D97-AF65-F5344CB8AC3E}">
+        <p14:creationId xmlns:p14="http://schemas.microsoft.com/office/powerpoint/2010/main" val="2801372882"/>
+      </p:ext>
+    </p:extLst>
+  </p:cSld>
+  <p:clrMap bg1="lt1" tx1="dk1" bg2="lt2" tx2="dk2" accent1="accent1" accent2="accent2" accent3="accent3" accent4="accent4" accent5="accent5" accent6="accent6" hlink="hlink" folHlink="folHlink"/>
+  <p:notesStyle>
+    <a:lvl1pPr marL="0" algn="l" defTabSz="914400" rtl="0" eaLnBrk="1" latinLnBrk="0" hangingPunct="1">
+      <a:defRPr sz="1200" kern="1200">
+        <a:solidFill>
+          <a:schemeClr val="tx1"/>
+        </a:solidFill>
+        <a:latin typeface="+mn-lt"/>
+        <a:ea typeface="+mn-ea"/>
+        <a:cs typeface="+mn-cs"/>
+      </a:defRPr>
+    </a:lvl1pPr>
+    <a:lvl2pPr marL="457200" algn="l" defTabSz="914400" rtl="0" eaLnBrk="1" latinLnBrk="0" hangingPunct="1">
+      <a:defRPr sz="1200" kern="1200">
+        <a:solidFill>
+          <a:schemeClr val="tx1"/>
+        </a:solidFill>
+        <a:latin typeface="+mn-lt"/>
+        <a:ea typeface="+mn-ea"/>
+        <a:cs typeface="+mn-cs"/>
+      </a:defRPr>
+    </a:lvl2pPr>
+    <a:lvl3pPr marL="914400" algn="l" defTabSz="914400" rtl="0" eaLnBrk="1" latinLnBrk="0" hangingPunct="1">
+      <a:defRPr sz="1200" kern="1200">
+        <a:solidFill>
+          <a:schemeClr val="tx1"/>
+        </a:solidFill>
+        <a:latin typeface="+mn-lt"/>
+        <a:ea typeface="+mn-ea"/>
+        <a:cs typeface="+mn-cs"/>
+      </a:defRPr>
+    </a:lvl3pPr>
+    <a:lvl4pPr marL="1371600" algn="l" defTabSz="914400" rtl="0" eaLnBrk="1" latinLnBrk="0" hangingPunct="1">
+      <a:defRPr sz="1200" kern="1200">
+        <a:solidFill>
+          <a:schemeClr val="tx1"/>
+        </a:solidFill>
+        <a:latin typeface="+mn-lt"/>
+        <a:ea typeface="+mn-ea"/>
+        <a:cs typeface="+mn-cs"/>
+      </a:defRPr>
+    </a:lvl4pPr>
+    <a:lvl5pPr marL="1828800" algn="l" defTabSz="914400" rtl="0" eaLnBrk="1" latinLnBrk="0" hangingPunct="1">
+      <a:defRPr sz="1200" kern="1200">
+        <a:solidFill>
+          <a:schemeClr val="tx1"/>
+        </a:solidFill>
+        <a:latin typeface="+mn-lt"/>
+        <a:ea typeface="+mn-ea"/>
+        <a:cs typeface="+mn-cs"/>
+      </a:defRPr>
+    </a:lvl5pPr>
+    <a:lvl6pPr marL="2286000" algn="l" defTabSz="914400" rtl="0" eaLnBrk="1" latinLnBrk="0" hangingPunct="1">
+      <a:defRPr sz="1200" kern="1200">
+        <a:solidFill>
+          <a:schemeClr val="tx1"/>
+        </a:solidFill>
+        <a:latin typeface="+mn-lt"/>
+        <a:ea typeface="+mn-ea"/>
+        <a:cs typeface="+mn-cs"/>
+      </a:defRPr>
+    </a:lvl6pPr>
+    <a:lvl7pPr marL="2743200" algn="l" defTabSz="914400" rtl="0" eaLnBrk="1" latinLnBrk="0" hangingPunct="1">
+      <a:defRPr sz="1200" kern="1200">
+        <a:solidFill>
+          <a:schemeClr val="tx1"/>
+        </a:solidFill>
+        <a:latin typeface="+mn-lt"/>
+        <a:ea typeface="+mn-ea"/>
+        <a:cs typeface="+mn-cs"/>
+      </a:defRPr>
+    </a:lvl7pPr>
+    <a:lvl8pPr marL="3200400" algn="l" defTabSz="914400" rtl="0" eaLnBrk="1" latinLnBrk="0" hangingPunct="1">
+      <a:defRPr sz="1200" kern="1200">
+        <a:solidFill>
+          <a:schemeClr val="tx1"/>
+        </a:solidFill>
+        <a:latin typeface="+mn-lt"/>
+        <a:ea typeface="+mn-ea"/>
+        <a:cs typeface="+mn-cs"/>
+      </a:defRPr>
+    </a:lvl8pPr>
+    <a:lvl9pPr marL="3657600" algn="l" defTabSz="914400" rtl="0" eaLnBrk="1" latinLnBrk="0" hangingPunct="1">
+      <a:defRPr sz="1200" kern="1200">
+        <a:solidFill>
+          <a:schemeClr val="tx1"/>
+        </a:solidFill>
+        <a:latin typeface="+mn-lt"/>
+        <a:ea typeface="+mn-ea"/>
+        <a:cs typeface="+mn-cs"/>
+      </a:defRPr>
+    </a:lvl9pPr>
+  </p:notesStyle>
+</p:notesMaster>
+</file>
+
+<file path=ppt/notesSlides/notesSlide1.xml><?xml version="1.0" encoding="utf-8"?>
+<p:notes xmlns:a="http://schemas.openxmlformats.org/drawingml/2006/main" xmlns:r="http://schemas.openxmlformats.org/officeDocument/2006/relationships" xmlns:p="http://schemas.openxmlformats.org/presentationml/2006/main">
+  <p:cSld>
+    <p:spTree>
+      <p:nvGrpSpPr>
+        <p:cNvPr id="1" name=""/>
+        <p:cNvGrpSpPr/>
+        <p:nvPr/>
+      </p:nvGrpSpPr>
+      <p:grpSpPr>
+        <a:xfrm>
+          <a:off x="0" y="0"/>
+          <a:ext cx="0" cy="0"/>
+          <a:chOff x="0" y="0"/>
+          <a:chExt cx="0" cy="0"/>
+        </a:xfrm>
+      </p:grpSpPr>
+      <p:sp>
+        <p:nvSpPr>
+          <p:cNvPr id="2" name="Slide Image Placeholder 1"/>
+          <p:cNvSpPr>
+            <a:spLocks noGrp="1" noRot="1" noChangeAspect="1"/>
+          </p:cNvSpPr>
+          <p:nvPr>
+            <p:ph type="sldImg"/>
+          </p:nvPr>
+        </p:nvSpPr>
+        <p:spPr/>
+      </p:sp>
+      <p:sp>
+        <p:nvSpPr>
+          <p:cNvPr id="3" name="Notes Placeholder 2"/>
+          <p:cNvSpPr>
+            <a:spLocks noGrp="1"/>
+          </p:cNvSpPr>
+          <p:nvPr>
+            <p:ph type="body" idx="1"/>
+          </p:nvPr>
+        </p:nvSpPr>
+        <p:spPr/>
+        <p:txBody>
+          <a:bodyPr/>
+          <a:lstStyle/>
+          <a:p>
+            <a:endParaRPr lang="en-US" dirty="0"/>
+          </a:p>
+        </p:txBody>
+      </p:sp>
+      <p:sp>
+        <p:nvSpPr>
+          <p:cNvPr id="4" name="Slide Number Placeholder 3"/>
+          <p:cNvSpPr>
+            <a:spLocks noGrp="1"/>
+          </p:cNvSpPr>
+          <p:nvPr>
+            <p:ph type="sldNum" sz="quarter" idx="5"/>
+          </p:nvPr>
+        </p:nvSpPr>
+        <p:spPr/>
+        <p:txBody>
+          <a:bodyPr/>
+          <a:lstStyle/>
+          <a:p>
+            <a:fld id="{5F7CED12-39B8-4FD8-B63C-C8AA8B7BCE9F}" type="slidenum">
+              <a:rPr lang="en-US" smtClean="0"/>
+              <a:t>1</a:t>
+            </a:fld>
+            <a:endParaRPr lang="en-US"/>
+          </a:p>
+        </p:txBody>
+      </p:sp>
+    </p:spTree>
+    <p:extLst>
+      <p:ext uri="{BB962C8B-B14F-4D97-AF65-F5344CB8AC3E}">
+        <p14:creationId xmlns:p14="http://schemas.microsoft.com/office/powerpoint/2010/main" val="3743271509"/>
+      </p:ext>
+    </p:extLst>
+  </p:cSld>
+  <p:clrMapOvr>
+    <a:masterClrMapping/>
+  </p:clrMapOvr>
+</p:notes>
+</file>
+
+<file path=ppt/notesSlides/notesSlide2.xml><?xml version="1.0" encoding="utf-8"?>
+<p:notes xmlns:a="http://schemas.openxmlformats.org/drawingml/2006/main" xmlns:r="http://schemas.openxmlformats.org/officeDocument/2006/relationships" xmlns:p="http://schemas.openxmlformats.org/presentationml/2006/main">
+  <p:cSld>
+    <p:spTree>
+      <p:nvGrpSpPr>
+        <p:cNvPr id="1" name=""/>
+        <p:cNvGrpSpPr/>
+        <p:nvPr/>
+      </p:nvGrpSpPr>
+      <p:grpSpPr>
+        <a:xfrm>
+          <a:off x="0" y="0"/>
+          <a:ext cx="0" cy="0"/>
+          <a:chOff x="0" y="0"/>
+          <a:chExt cx="0" cy="0"/>
+        </a:xfrm>
+      </p:grpSpPr>
+      <p:sp>
+        <p:nvSpPr>
+          <p:cNvPr id="2" name="Slide Image Placeholder 1"/>
+          <p:cNvSpPr>
+            <a:spLocks noGrp="1" noRot="1" noChangeAspect="1"/>
+          </p:cNvSpPr>
+          <p:nvPr>
+            <p:ph type="sldImg"/>
+          </p:nvPr>
+        </p:nvSpPr>
+        <p:spPr/>
+      </p:sp>
+      <p:sp>
+        <p:nvSpPr>
+          <p:cNvPr id="3" name="Notes Placeholder 2"/>
+          <p:cNvSpPr>
+            <a:spLocks noGrp="1"/>
+          </p:cNvSpPr>
+          <p:nvPr>
+            <p:ph type="body" idx="1"/>
+          </p:nvPr>
+        </p:nvSpPr>
+        <p:spPr/>
+        <p:txBody>
+          <a:bodyPr/>
+          <a:lstStyle/>
+          <a:p>
+            <a:r>
+              <a:rPr lang="en-US" dirty="0">
+                <a:effectLst/>
+              </a:rPr>
+              <a:t>114.1 85.0 294.5 102.4 78.4 292.8 102.8 79.6 281.6 88.8 66.5 [12] 214.1 71.0 52.0 130.0 55.3 48.2 105.9 44.5 47.5 88.0 34.8 [23] 37.2 104.0</a:t>
+            </a:r>
+            <a:endParaRPr lang="en-US" dirty="0"/>
+          </a:p>
+        </p:txBody>
+      </p:sp>
+      <p:sp>
+        <p:nvSpPr>
+          <p:cNvPr id="4" name="Slide Number Placeholder 3"/>
+          <p:cNvSpPr>
+            <a:spLocks noGrp="1"/>
+          </p:cNvSpPr>
+          <p:nvPr>
+            <p:ph type="sldNum" sz="quarter" idx="5"/>
+          </p:nvPr>
+        </p:nvSpPr>
+        <p:spPr/>
+        <p:txBody>
+          <a:bodyPr/>
+          <a:lstStyle/>
+          <a:p>
+            <a:fld id="{5F7CED12-39B8-4FD8-B63C-C8AA8B7BCE9F}" type="slidenum">
+              <a:rPr lang="en-US" smtClean="0"/>
+              <a:t>2</a:t>
+            </a:fld>
+            <a:endParaRPr lang="en-US"/>
+          </a:p>
+        </p:txBody>
+      </p:sp>
+    </p:spTree>
+    <p:extLst>
+      <p:ext uri="{BB962C8B-B14F-4D97-AF65-F5344CB8AC3E}">
+        <p14:creationId xmlns:p14="http://schemas.microsoft.com/office/powerpoint/2010/main" val="2303438684"/>
+      </p:ext>
+    </p:extLst>
+  </p:cSld>
+  <p:clrMapOvr>
+    <a:masterClrMapping/>
+  </p:clrMapOvr>
+</p:notes>
 </file>
 
 <file path=ppt/slideLayouts/slideLayout1.xml><?xml version="1.0" encoding="utf-8"?>
@@ -321,7 +1299,7 @@
           <a:p>
             <a:fld id="{15541A1B-5136-478E-A332-07FC643323C2}" type="datetimeFigureOut">
               <a:rPr lang="en-US" smtClean="0"/>
-              <a:t>1/23/2024</a:t>
+              <a:t>5/23/2024</a:t>
             </a:fld>
             <a:endParaRPr lang="en-US"/>
           </a:p>
@@ -519,7 +1497,7 @@
           <a:p>
             <a:fld id="{15541A1B-5136-478E-A332-07FC643323C2}" type="datetimeFigureOut">
               <a:rPr lang="en-US" smtClean="0"/>
-              <a:t>1/23/2024</a:t>
+              <a:t>5/23/2024</a:t>
             </a:fld>
             <a:endParaRPr lang="en-US"/>
           </a:p>
@@ -727,7 +1705,7 @@
           <a:p>
             <a:fld id="{15541A1B-5136-478E-A332-07FC643323C2}" type="datetimeFigureOut">
               <a:rPr lang="en-US" smtClean="0"/>
-              <a:t>1/23/2024</a:t>
+              <a:t>5/23/2024</a:t>
             </a:fld>
             <a:endParaRPr lang="en-US"/>
           </a:p>
@@ -925,7 +1903,7 @@
           <a:p>
             <a:fld id="{15541A1B-5136-478E-A332-07FC643323C2}" type="datetimeFigureOut">
               <a:rPr lang="en-US" smtClean="0"/>
-              <a:t>1/23/2024</a:t>
+              <a:t>5/23/2024</a:t>
             </a:fld>
             <a:endParaRPr lang="en-US"/>
           </a:p>
@@ -1200,7 +2178,7 @@
           <a:p>
             <a:fld id="{15541A1B-5136-478E-A332-07FC643323C2}" type="datetimeFigureOut">
               <a:rPr lang="en-US" smtClean="0"/>
-              <a:t>1/23/2024</a:t>
+              <a:t>5/23/2024</a:t>
             </a:fld>
             <a:endParaRPr lang="en-US"/>
           </a:p>
@@ -1465,7 +2443,7 @@
           <a:p>
             <a:fld id="{15541A1B-5136-478E-A332-07FC643323C2}" type="datetimeFigureOut">
               <a:rPr lang="en-US" smtClean="0"/>
-              <a:t>1/23/2024</a:t>
+              <a:t>5/23/2024</a:t>
             </a:fld>
             <a:endParaRPr lang="en-US"/>
           </a:p>
@@ -1877,7 +2855,7 @@
           <a:p>
             <a:fld id="{15541A1B-5136-478E-A332-07FC643323C2}" type="datetimeFigureOut">
               <a:rPr lang="en-US" smtClean="0"/>
-              <a:t>1/23/2024</a:t>
+              <a:t>5/23/2024</a:t>
             </a:fld>
             <a:endParaRPr lang="en-US"/>
           </a:p>
@@ -2018,7 +2996,7 @@
           <a:p>
             <a:fld id="{15541A1B-5136-478E-A332-07FC643323C2}" type="datetimeFigureOut">
               <a:rPr lang="en-US" smtClean="0"/>
-              <a:t>1/23/2024</a:t>
+              <a:t>5/23/2024</a:t>
             </a:fld>
             <a:endParaRPr lang="en-US"/>
           </a:p>
@@ -2131,7 +3109,7 @@
           <a:p>
             <a:fld id="{15541A1B-5136-478E-A332-07FC643323C2}" type="datetimeFigureOut">
               <a:rPr lang="en-US" smtClean="0"/>
-              <a:t>1/23/2024</a:t>
+              <a:t>5/23/2024</a:t>
             </a:fld>
             <a:endParaRPr lang="en-US"/>
           </a:p>
@@ -2442,7 +3420,7 @@
           <a:p>
             <a:fld id="{15541A1B-5136-478E-A332-07FC643323C2}" type="datetimeFigureOut">
               <a:rPr lang="en-US" smtClean="0"/>
-              <a:t>1/23/2024</a:t>
+              <a:t>5/23/2024</a:t>
             </a:fld>
             <a:endParaRPr lang="en-US"/>
           </a:p>
@@ -2730,7 +3708,7 @@
           <a:p>
             <a:fld id="{15541A1B-5136-478E-A332-07FC643323C2}" type="datetimeFigureOut">
               <a:rPr lang="en-US" smtClean="0"/>
-              <a:t>1/23/2024</a:t>
+              <a:t>5/23/2024</a:t>
             </a:fld>
             <a:endParaRPr lang="en-US"/>
           </a:p>
@@ -2971,7 +3949,7 @@
           <a:p>
             <a:fld id="{15541A1B-5136-478E-A332-07FC643323C2}" type="datetimeFigureOut">
               <a:rPr lang="en-US" smtClean="0"/>
-              <a:t>1/23/2024</a:t>
+              <a:t>5/23/2024</a:t>
             </a:fld>
             <a:endParaRPr lang="en-US"/>
           </a:p>
@@ -3403,7 +4381,7 @@
           <p:nvPr/>
         </p:nvPicPr>
         <p:blipFill>
-          <a:blip r:embed="rId2">
+          <a:blip r:embed="rId3">
             <a:extLst>
               <a:ext uri="{28A0092B-C50C-407E-A947-70E740481C1C}">
                 <a14:useLocalDpi xmlns:a14="http://schemas.microsoft.com/office/drawing/2010/main" val="0"/>
@@ -4478,45 +5456,10 @@
       </p:grpSpPr>
       <p:pic>
         <p:nvPicPr>
-          <p:cNvPr id="3" name="Picture 2">
-            <a:extLst>
-              <a:ext uri="{FF2B5EF4-FFF2-40B4-BE49-F238E27FC236}">
-                <a16:creationId xmlns:a16="http://schemas.microsoft.com/office/drawing/2014/main" id="{3D57F2A4-4928-7BA5-20AB-93612B350704}"/>
-              </a:ext>
-            </a:extLst>
-          </p:cNvPr>
-          <p:cNvPicPr>
-            <a:picLocks noChangeAspect="1"/>
-          </p:cNvPicPr>
-          <p:nvPr/>
-        </p:nvPicPr>
-        <p:blipFill>
-          <a:blip r:embed="rId2">
-            <a:extLst>
-              <a:ext uri="{28A0092B-C50C-407E-A947-70E740481C1C}">
-                <a14:useLocalDpi xmlns:a14="http://schemas.microsoft.com/office/drawing/2010/main" val="0"/>
-              </a:ext>
-            </a:extLst>
-          </a:blip>
-          <a:srcRect/>
-          <a:stretch/>
-        </p:blipFill>
-        <p:spPr>
-          <a:xfrm>
-            <a:off x="1295400" y="292608"/>
-            <a:ext cx="9601199" cy="3200399"/>
-          </a:xfrm>
-          <a:prstGeom prst="rect">
-            <a:avLst/>
-          </a:prstGeom>
-        </p:spPr>
-      </p:pic>
-      <p:pic>
-        <p:nvPicPr>
           <p:cNvPr id="5" name="Picture 4">
             <a:extLst>
               <a:ext uri="{FF2B5EF4-FFF2-40B4-BE49-F238E27FC236}">
-                <a16:creationId xmlns:a16="http://schemas.microsoft.com/office/drawing/2014/main" id="{C2DBD93F-D168-792E-C84C-0A543A2773EA}"/>
+                <a16:creationId xmlns:a16="http://schemas.microsoft.com/office/drawing/2014/main" id="{22982135-07CD-1E91-01C0-C6AB3B4B4FC8}"/>
               </a:ext>
             </a:extLst>
           </p:cNvPr>
@@ -4538,8 +5481,8 @@
         </p:blipFill>
         <p:spPr>
           <a:xfrm>
-            <a:off x="1295400" y="3657600"/>
-            <a:ext cx="9601200" cy="3200400"/>
+            <a:off x="0" y="177800"/>
+            <a:ext cx="12191999" cy="6502400"/>
           </a:xfrm>
           <a:prstGeom prst="rect">
             <a:avLst/>
@@ -4551,7 +5494,7 @@
           <p:cNvPr id="6" name="TextBox 5">
             <a:extLst>
               <a:ext uri="{FF2B5EF4-FFF2-40B4-BE49-F238E27FC236}">
-                <a16:creationId xmlns:a16="http://schemas.microsoft.com/office/drawing/2014/main" id="{87D50C79-DDC2-8400-881A-167B2311919E}"/>
+                <a16:creationId xmlns:a16="http://schemas.microsoft.com/office/drawing/2014/main" id="{29D2CA35-6322-94C8-E65D-12B7682DBD59}"/>
               </a:ext>
             </a:extLst>
           </p:cNvPr>
@@ -4560,8 +5503,8 @@
         </p:nvSpPr>
         <p:spPr>
           <a:xfrm>
-            <a:off x="1517904" y="25646"/>
-            <a:ext cx="4123944" cy="369332"/>
+            <a:off x="987552" y="1700784"/>
+            <a:ext cx="475488" cy="261610"/>
           </a:xfrm>
           <a:prstGeom prst="rect">
             <a:avLst/>
@@ -4575,8 +5518,11 @@
           <a:lstStyle/>
           <a:p>
             <a:r>
-              <a:rPr lang="en-US" dirty="0"/>
-              <a:t>Live PSME tree size distribution over time</a:t>
+              <a:rPr lang="en-US" sz="1100" dirty="0">
+                <a:latin typeface="Times New Roman" panose="02020603050405020304" pitchFamily="18" charset="0"/>
+                <a:cs typeface="Times New Roman" panose="02020603050405020304" pitchFamily="18" charset="0"/>
+              </a:rPr>
+              <a:t>85</a:t>
             </a:r>
           </a:p>
         </p:txBody>
@@ -4586,7 +5532,7 @@
           <p:cNvPr id="7" name="TextBox 6">
             <a:extLst>
               <a:ext uri="{FF2B5EF4-FFF2-40B4-BE49-F238E27FC236}">
-                <a16:creationId xmlns:a16="http://schemas.microsoft.com/office/drawing/2014/main" id="{3AACAA4B-580B-0673-A447-F0A50DE80E40}"/>
+                <a16:creationId xmlns:a16="http://schemas.microsoft.com/office/drawing/2014/main" id="{78E9559A-00BC-8676-BF6F-F1447FE1F967}"/>
               </a:ext>
             </a:extLst>
           </p:cNvPr>
@@ -4595,8 +5541,8 @@
         </p:nvSpPr>
         <p:spPr>
           <a:xfrm>
-            <a:off x="1517904" y="3335774"/>
-            <a:ext cx="4288536" cy="369332"/>
+            <a:off x="2301240" y="1700784"/>
+            <a:ext cx="475488" cy="261610"/>
           </a:xfrm>
           <a:prstGeom prst="rect">
             <a:avLst/>
@@ -4610,8 +5556,957 @@
           <a:lstStyle/>
           <a:p>
             <a:r>
-              <a:rPr lang="en-US" dirty="0"/>
-              <a:t>Dead PSME tree size distribution over time</a:t>
+              <a:rPr lang="en-US" sz="1100" dirty="0">
+                <a:latin typeface="Times New Roman" panose="02020603050405020304" pitchFamily="18" charset="0"/>
+                <a:cs typeface="Times New Roman" panose="02020603050405020304" pitchFamily="18" charset="0"/>
+              </a:rPr>
+              <a:t>78</a:t>
+            </a:r>
+          </a:p>
+        </p:txBody>
+      </p:sp>
+      <p:sp>
+        <p:nvSpPr>
+          <p:cNvPr id="8" name="TextBox 7">
+            <a:extLst>
+              <a:ext uri="{FF2B5EF4-FFF2-40B4-BE49-F238E27FC236}">
+                <a16:creationId xmlns:a16="http://schemas.microsoft.com/office/drawing/2014/main" id="{0569955A-4275-4E47-C627-AB644F2EE6F1}"/>
+              </a:ext>
+            </a:extLst>
+          </p:cNvPr>
+          <p:cNvSpPr txBox="1"/>
+          <p:nvPr/>
+        </p:nvSpPr>
+        <p:spPr>
+          <a:xfrm>
+            <a:off x="3544824" y="1700784"/>
+            <a:ext cx="475488" cy="261610"/>
+          </a:xfrm>
+          <a:prstGeom prst="rect">
+            <a:avLst/>
+          </a:prstGeom>
+          <a:noFill/>
+        </p:spPr>
+        <p:txBody>
+          <a:bodyPr wrap="square" rtlCol="0">
+            <a:spAutoFit/>
+          </a:bodyPr>
+          <a:lstStyle/>
+          <a:p>
+            <a:r>
+              <a:rPr lang="en-US" sz="1100" dirty="0">
+                <a:latin typeface="Times New Roman" panose="02020603050405020304" pitchFamily="18" charset="0"/>
+                <a:cs typeface="Times New Roman" panose="02020603050405020304" pitchFamily="18" charset="0"/>
+              </a:rPr>
+              <a:t>80</a:t>
+            </a:r>
+          </a:p>
+        </p:txBody>
+      </p:sp>
+      <p:sp>
+        <p:nvSpPr>
+          <p:cNvPr id="9" name="TextBox 8">
+            <a:extLst>
+              <a:ext uri="{FF2B5EF4-FFF2-40B4-BE49-F238E27FC236}">
+                <a16:creationId xmlns:a16="http://schemas.microsoft.com/office/drawing/2014/main" id="{7B1B4A24-4887-8AB9-F810-3F113F742E50}"/>
+              </a:ext>
+            </a:extLst>
+          </p:cNvPr>
+          <p:cNvSpPr txBox="1"/>
+          <p:nvPr/>
+        </p:nvSpPr>
+        <p:spPr>
+          <a:xfrm>
+            <a:off x="4835652" y="1700784"/>
+            <a:ext cx="475488" cy="261610"/>
+          </a:xfrm>
+          <a:prstGeom prst="rect">
+            <a:avLst/>
+          </a:prstGeom>
+          <a:noFill/>
+        </p:spPr>
+        <p:txBody>
+          <a:bodyPr wrap="square" rtlCol="0">
+            <a:spAutoFit/>
+          </a:bodyPr>
+          <a:lstStyle/>
+          <a:p>
+            <a:r>
+              <a:rPr lang="en-US" sz="1100" dirty="0">
+                <a:latin typeface="Times New Roman" panose="02020603050405020304" pitchFamily="18" charset="0"/>
+                <a:cs typeface="Times New Roman" panose="02020603050405020304" pitchFamily="18" charset="0"/>
+              </a:rPr>
+              <a:t>67</a:t>
+            </a:r>
+          </a:p>
+        </p:txBody>
+      </p:sp>
+      <p:sp>
+        <p:nvSpPr>
+          <p:cNvPr id="10" name="TextBox 9">
+            <a:extLst>
+              <a:ext uri="{FF2B5EF4-FFF2-40B4-BE49-F238E27FC236}">
+                <a16:creationId xmlns:a16="http://schemas.microsoft.com/office/drawing/2014/main" id="{459B017E-95F6-9AFB-7871-5E69886B1CC2}"/>
+              </a:ext>
+            </a:extLst>
+          </p:cNvPr>
+          <p:cNvSpPr txBox="1"/>
+          <p:nvPr/>
+        </p:nvSpPr>
+        <p:spPr>
+          <a:xfrm>
+            <a:off x="6096000" y="1700784"/>
+            <a:ext cx="475488" cy="261610"/>
+          </a:xfrm>
+          <a:prstGeom prst="rect">
+            <a:avLst/>
+          </a:prstGeom>
+          <a:noFill/>
+        </p:spPr>
+        <p:txBody>
+          <a:bodyPr wrap="square" rtlCol="0">
+            <a:spAutoFit/>
+          </a:bodyPr>
+          <a:lstStyle/>
+          <a:p>
+            <a:r>
+              <a:rPr lang="en-US" sz="1100" dirty="0">
+                <a:latin typeface="Times New Roman" panose="02020603050405020304" pitchFamily="18" charset="0"/>
+                <a:cs typeface="Times New Roman" panose="02020603050405020304" pitchFamily="18" charset="0"/>
+              </a:rPr>
+              <a:t>52</a:t>
+            </a:r>
+          </a:p>
+        </p:txBody>
+      </p:sp>
+      <p:sp>
+        <p:nvSpPr>
+          <p:cNvPr id="11" name="TextBox 10">
+            <a:extLst>
+              <a:ext uri="{FF2B5EF4-FFF2-40B4-BE49-F238E27FC236}">
+                <a16:creationId xmlns:a16="http://schemas.microsoft.com/office/drawing/2014/main" id="{201F2199-3E42-4905-E3DA-E1E8A00051C8}"/>
+              </a:ext>
+            </a:extLst>
+          </p:cNvPr>
+          <p:cNvSpPr txBox="1"/>
+          <p:nvPr/>
+        </p:nvSpPr>
+        <p:spPr>
+          <a:xfrm>
+            <a:off x="7409688" y="1700784"/>
+            <a:ext cx="475488" cy="261610"/>
+          </a:xfrm>
+          <a:prstGeom prst="rect">
+            <a:avLst/>
+          </a:prstGeom>
+          <a:noFill/>
+        </p:spPr>
+        <p:txBody>
+          <a:bodyPr wrap="square" rtlCol="0">
+            <a:spAutoFit/>
+          </a:bodyPr>
+          <a:lstStyle/>
+          <a:p>
+            <a:r>
+              <a:rPr lang="en-US" sz="1100" dirty="0">
+                <a:latin typeface="Times New Roman" panose="02020603050405020304" pitchFamily="18" charset="0"/>
+                <a:cs typeface="Times New Roman" panose="02020603050405020304" pitchFamily="18" charset="0"/>
+              </a:rPr>
+              <a:t>48</a:t>
+            </a:r>
+          </a:p>
+        </p:txBody>
+      </p:sp>
+      <p:sp>
+        <p:nvSpPr>
+          <p:cNvPr id="12" name="TextBox 11">
+            <a:extLst>
+              <a:ext uri="{FF2B5EF4-FFF2-40B4-BE49-F238E27FC236}">
+                <a16:creationId xmlns:a16="http://schemas.microsoft.com/office/drawing/2014/main" id="{FAE510AA-7A69-9503-E457-265764C0229C}"/>
+              </a:ext>
+            </a:extLst>
+          </p:cNvPr>
+          <p:cNvSpPr txBox="1"/>
+          <p:nvPr/>
+        </p:nvSpPr>
+        <p:spPr>
+          <a:xfrm>
+            <a:off x="8653272" y="1700784"/>
+            <a:ext cx="475488" cy="261610"/>
+          </a:xfrm>
+          <a:prstGeom prst="rect">
+            <a:avLst/>
+          </a:prstGeom>
+          <a:noFill/>
+        </p:spPr>
+        <p:txBody>
+          <a:bodyPr wrap="square" rtlCol="0">
+            <a:spAutoFit/>
+          </a:bodyPr>
+          <a:lstStyle/>
+          <a:p>
+            <a:r>
+              <a:rPr lang="en-US" sz="1100" dirty="0">
+                <a:latin typeface="Times New Roman" panose="02020603050405020304" pitchFamily="18" charset="0"/>
+                <a:cs typeface="Times New Roman" panose="02020603050405020304" pitchFamily="18" charset="0"/>
+              </a:rPr>
+              <a:t>48</a:t>
+            </a:r>
+          </a:p>
+        </p:txBody>
+      </p:sp>
+      <p:sp>
+        <p:nvSpPr>
+          <p:cNvPr id="13" name="TextBox 12">
+            <a:extLst>
+              <a:ext uri="{FF2B5EF4-FFF2-40B4-BE49-F238E27FC236}">
+                <a16:creationId xmlns:a16="http://schemas.microsoft.com/office/drawing/2014/main" id="{53EB426C-F330-4403-076B-D5794692E239}"/>
+              </a:ext>
+            </a:extLst>
+          </p:cNvPr>
+          <p:cNvSpPr txBox="1"/>
+          <p:nvPr/>
+        </p:nvSpPr>
+        <p:spPr>
+          <a:xfrm>
+            <a:off x="9944100" y="1700784"/>
+            <a:ext cx="475488" cy="261610"/>
+          </a:xfrm>
+          <a:prstGeom prst="rect">
+            <a:avLst/>
+          </a:prstGeom>
+          <a:noFill/>
+        </p:spPr>
+        <p:txBody>
+          <a:bodyPr wrap="square" rtlCol="0">
+            <a:spAutoFit/>
+          </a:bodyPr>
+          <a:lstStyle/>
+          <a:p>
+            <a:r>
+              <a:rPr lang="en-US" sz="1100" dirty="0">
+                <a:latin typeface="Times New Roman" panose="02020603050405020304" pitchFamily="18" charset="0"/>
+                <a:cs typeface="Times New Roman" panose="02020603050405020304" pitchFamily="18" charset="0"/>
+              </a:rPr>
+              <a:t>37</a:t>
+            </a:r>
+          </a:p>
+        </p:txBody>
+      </p:sp>
+      <p:sp>
+        <p:nvSpPr>
+          <p:cNvPr id="14" name="TextBox 13">
+            <a:extLst>
+              <a:ext uri="{FF2B5EF4-FFF2-40B4-BE49-F238E27FC236}">
+                <a16:creationId xmlns:a16="http://schemas.microsoft.com/office/drawing/2014/main" id="{AC3AB16B-9817-9D08-D2F6-CEB52CD56E3D}"/>
+              </a:ext>
+            </a:extLst>
+          </p:cNvPr>
+          <p:cNvSpPr txBox="1"/>
+          <p:nvPr/>
+        </p:nvSpPr>
+        <p:spPr>
+          <a:xfrm>
+            <a:off x="987552" y="2959608"/>
+            <a:ext cx="475488" cy="261610"/>
+          </a:xfrm>
+          <a:prstGeom prst="rect">
+            <a:avLst/>
+          </a:prstGeom>
+          <a:noFill/>
+        </p:spPr>
+        <p:txBody>
+          <a:bodyPr wrap="square" rtlCol="0">
+            <a:spAutoFit/>
+          </a:bodyPr>
+          <a:lstStyle/>
+          <a:p>
+            <a:r>
+              <a:rPr lang="en-US" sz="1100" dirty="0">
+                <a:latin typeface="Times New Roman" panose="02020603050405020304" pitchFamily="18" charset="0"/>
+                <a:cs typeface="Times New Roman" panose="02020603050405020304" pitchFamily="18" charset="0"/>
+              </a:rPr>
+              <a:t>114</a:t>
+            </a:r>
+          </a:p>
+        </p:txBody>
+      </p:sp>
+      <p:sp>
+        <p:nvSpPr>
+          <p:cNvPr id="15" name="TextBox 14">
+            <a:extLst>
+              <a:ext uri="{FF2B5EF4-FFF2-40B4-BE49-F238E27FC236}">
+                <a16:creationId xmlns:a16="http://schemas.microsoft.com/office/drawing/2014/main" id="{61A93925-B8C8-1A4C-DA08-B30CC58C06DA}"/>
+              </a:ext>
+            </a:extLst>
+          </p:cNvPr>
+          <p:cNvSpPr txBox="1"/>
+          <p:nvPr/>
+        </p:nvSpPr>
+        <p:spPr>
+          <a:xfrm>
+            <a:off x="2301240" y="2959608"/>
+            <a:ext cx="475488" cy="261610"/>
+          </a:xfrm>
+          <a:prstGeom prst="rect">
+            <a:avLst/>
+          </a:prstGeom>
+          <a:noFill/>
+        </p:spPr>
+        <p:txBody>
+          <a:bodyPr wrap="square" rtlCol="0">
+            <a:spAutoFit/>
+          </a:bodyPr>
+          <a:lstStyle/>
+          <a:p>
+            <a:r>
+              <a:rPr lang="en-US" sz="1100" dirty="0">
+                <a:latin typeface="Times New Roman" panose="02020603050405020304" pitchFamily="18" charset="0"/>
+                <a:cs typeface="Times New Roman" panose="02020603050405020304" pitchFamily="18" charset="0"/>
+              </a:rPr>
+              <a:t>102</a:t>
+            </a:r>
+          </a:p>
+        </p:txBody>
+      </p:sp>
+      <p:sp>
+        <p:nvSpPr>
+          <p:cNvPr id="16" name="TextBox 15">
+            <a:extLst>
+              <a:ext uri="{FF2B5EF4-FFF2-40B4-BE49-F238E27FC236}">
+                <a16:creationId xmlns:a16="http://schemas.microsoft.com/office/drawing/2014/main" id="{4CBD9A7D-402B-AFC4-7C08-2A5F5A63CE00}"/>
+              </a:ext>
+            </a:extLst>
+          </p:cNvPr>
+          <p:cNvSpPr txBox="1"/>
+          <p:nvPr/>
+        </p:nvSpPr>
+        <p:spPr>
+          <a:xfrm>
+            <a:off x="3544824" y="2959608"/>
+            <a:ext cx="475488" cy="261610"/>
+          </a:xfrm>
+          <a:prstGeom prst="rect">
+            <a:avLst/>
+          </a:prstGeom>
+          <a:noFill/>
+        </p:spPr>
+        <p:txBody>
+          <a:bodyPr wrap="square" rtlCol="0">
+            <a:spAutoFit/>
+          </a:bodyPr>
+          <a:lstStyle/>
+          <a:p>
+            <a:r>
+              <a:rPr lang="en-US" sz="1100" dirty="0">
+                <a:latin typeface="Times New Roman" panose="02020603050405020304" pitchFamily="18" charset="0"/>
+                <a:cs typeface="Times New Roman" panose="02020603050405020304" pitchFamily="18" charset="0"/>
+              </a:rPr>
+              <a:t>103</a:t>
+            </a:r>
+          </a:p>
+        </p:txBody>
+      </p:sp>
+      <p:sp>
+        <p:nvSpPr>
+          <p:cNvPr id="17" name="TextBox 16">
+            <a:extLst>
+              <a:ext uri="{FF2B5EF4-FFF2-40B4-BE49-F238E27FC236}">
+                <a16:creationId xmlns:a16="http://schemas.microsoft.com/office/drawing/2014/main" id="{6F7E0A08-AA3A-D65B-4CE9-EB94FA64E5B8}"/>
+              </a:ext>
+            </a:extLst>
+          </p:cNvPr>
+          <p:cNvSpPr txBox="1"/>
+          <p:nvPr/>
+        </p:nvSpPr>
+        <p:spPr>
+          <a:xfrm>
+            <a:off x="4835652" y="2959608"/>
+            <a:ext cx="475488" cy="261610"/>
+          </a:xfrm>
+          <a:prstGeom prst="rect">
+            <a:avLst/>
+          </a:prstGeom>
+          <a:noFill/>
+        </p:spPr>
+        <p:txBody>
+          <a:bodyPr wrap="square" rtlCol="0">
+            <a:spAutoFit/>
+          </a:bodyPr>
+          <a:lstStyle/>
+          <a:p>
+            <a:r>
+              <a:rPr lang="en-US" sz="1100" dirty="0">
+                <a:latin typeface="Times New Roman" panose="02020603050405020304" pitchFamily="18" charset="0"/>
+                <a:cs typeface="Times New Roman" panose="02020603050405020304" pitchFamily="18" charset="0"/>
+              </a:rPr>
+              <a:t>89</a:t>
+            </a:r>
+          </a:p>
+        </p:txBody>
+      </p:sp>
+      <p:sp>
+        <p:nvSpPr>
+          <p:cNvPr id="18" name="TextBox 17">
+            <a:extLst>
+              <a:ext uri="{FF2B5EF4-FFF2-40B4-BE49-F238E27FC236}">
+                <a16:creationId xmlns:a16="http://schemas.microsoft.com/office/drawing/2014/main" id="{43A96966-4E69-EC5F-308A-FFD2A1609FFB}"/>
+              </a:ext>
+            </a:extLst>
+          </p:cNvPr>
+          <p:cNvSpPr txBox="1"/>
+          <p:nvPr/>
+        </p:nvSpPr>
+        <p:spPr>
+          <a:xfrm>
+            <a:off x="6096000" y="2959608"/>
+            <a:ext cx="475488" cy="261610"/>
+          </a:xfrm>
+          <a:prstGeom prst="rect">
+            <a:avLst/>
+          </a:prstGeom>
+          <a:noFill/>
+        </p:spPr>
+        <p:txBody>
+          <a:bodyPr wrap="square" rtlCol="0">
+            <a:spAutoFit/>
+          </a:bodyPr>
+          <a:lstStyle/>
+          <a:p>
+            <a:r>
+              <a:rPr lang="en-US" sz="1100" dirty="0">
+                <a:latin typeface="Times New Roman" panose="02020603050405020304" pitchFamily="18" charset="0"/>
+                <a:cs typeface="Times New Roman" panose="02020603050405020304" pitchFamily="18" charset="0"/>
+              </a:rPr>
+              <a:t>71</a:t>
+            </a:r>
+          </a:p>
+        </p:txBody>
+      </p:sp>
+      <p:sp>
+        <p:nvSpPr>
+          <p:cNvPr id="19" name="TextBox 18">
+            <a:extLst>
+              <a:ext uri="{FF2B5EF4-FFF2-40B4-BE49-F238E27FC236}">
+                <a16:creationId xmlns:a16="http://schemas.microsoft.com/office/drawing/2014/main" id="{06A6B925-BCEB-3CA7-B367-271F2C003B1C}"/>
+              </a:ext>
+            </a:extLst>
+          </p:cNvPr>
+          <p:cNvSpPr txBox="1"/>
+          <p:nvPr/>
+        </p:nvSpPr>
+        <p:spPr>
+          <a:xfrm>
+            <a:off x="7409688" y="2959608"/>
+            <a:ext cx="475488" cy="261610"/>
+          </a:xfrm>
+          <a:prstGeom prst="rect">
+            <a:avLst/>
+          </a:prstGeom>
+          <a:noFill/>
+        </p:spPr>
+        <p:txBody>
+          <a:bodyPr wrap="square" rtlCol="0">
+            <a:spAutoFit/>
+          </a:bodyPr>
+          <a:lstStyle/>
+          <a:p>
+            <a:r>
+              <a:rPr lang="en-US" sz="1100" dirty="0">
+                <a:latin typeface="Times New Roman" panose="02020603050405020304" pitchFamily="18" charset="0"/>
+                <a:cs typeface="Times New Roman" panose="02020603050405020304" pitchFamily="18" charset="0"/>
+              </a:rPr>
+              <a:t>55</a:t>
+            </a:r>
+          </a:p>
+        </p:txBody>
+      </p:sp>
+      <p:sp>
+        <p:nvSpPr>
+          <p:cNvPr id="20" name="TextBox 19">
+            <a:extLst>
+              <a:ext uri="{FF2B5EF4-FFF2-40B4-BE49-F238E27FC236}">
+                <a16:creationId xmlns:a16="http://schemas.microsoft.com/office/drawing/2014/main" id="{EAAC82DB-063B-C2CE-CF93-7A43A7D4FFAB}"/>
+              </a:ext>
+            </a:extLst>
+          </p:cNvPr>
+          <p:cNvSpPr txBox="1"/>
+          <p:nvPr/>
+        </p:nvSpPr>
+        <p:spPr>
+          <a:xfrm>
+            <a:off x="8653272" y="2959608"/>
+            <a:ext cx="475488" cy="261610"/>
+          </a:xfrm>
+          <a:prstGeom prst="rect">
+            <a:avLst/>
+          </a:prstGeom>
+          <a:noFill/>
+        </p:spPr>
+        <p:txBody>
+          <a:bodyPr wrap="square" rtlCol="0">
+            <a:spAutoFit/>
+          </a:bodyPr>
+          <a:lstStyle/>
+          <a:p>
+            <a:r>
+              <a:rPr lang="en-US" sz="1100" dirty="0">
+                <a:latin typeface="Times New Roman" panose="02020603050405020304" pitchFamily="18" charset="0"/>
+                <a:cs typeface="Times New Roman" panose="02020603050405020304" pitchFamily="18" charset="0"/>
+              </a:rPr>
+              <a:t>45</a:t>
+            </a:r>
+          </a:p>
+        </p:txBody>
+      </p:sp>
+      <p:sp>
+        <p:nvSpPr>
+          <p:cNvPr id="21" name="TextBox 20">
+            <a:extLst>
+              <a:ext uri="{FF2B5EF4-FFF2-40B4-BE49-F238E27FC236}">
+                <a16:creationId xmlns:a16="http://schemas.microsoft.com/office/drawing/2014/main" id="{074F1832-A810-84D7-F0AC-FC026D0F38A9}"/>
+              </a:ext>
+            </a:extLst>
+          </p:cNvPr>
+          <p:cNvSpPr txBox="1"/>
+          <p:nvPr/>
+        </p:nvSpPr>
+        <p:spPr>
+          <a:xfrm>
+            <a:off x="9944100" y="2959608"/>
+            <a:ext cx="475488" cy="261610"/>
+          </a:xfrm>
+          <a:prstGeom prst="rect">
+            <a:avLst/>
+          </a:prstGeom>
+          <a:noFill/>
+        </p:spPr>
+        <p:txBody>
+          <a:bodyPr wrap="square" rtlCol="0">
+            <a:spAutoFit/>
+          </a:bodyPr>
+          <a:lstStyle/>
+          <a:p>
+            <a:r>
+              <a:rPr lang="en-US" sz="1100" dirty="0">
+                <a:latin typeface="Times New Roman" panose="02020603050405020304" pitchFamily="18" charset="0"/>
+                <a:cs typeface="Times New Roman" panose="02020603050405020304" pitchFamily="18" charset="0"/>
+              </a:rPr>
+              <a:t>35</a:t>
+            </a:r>
+          </a:p>
+        </p:txBody>
+      </p:sp>
+      <p:sp>
+        <p:nvSpPr>
+          <p:cNvPr id="22" name="TextBox 21">
+            <a:extLst>
+              <a:ext uri="{FF2B5EF4-FFF2-40B4-BE49-F238E27FC236}">
+                <a16:creationId xmlns:a16="http://schemas.microsoft.com/office/drawing/2014/main" id="{01F65EAB-1546-5DD6-CDF7-F62B145B2EFA}"/>
+              </a:ext>
+            </a:extLst>
+          </p:cNvPr>
+          <p:cNvSpPr txBox="1"/>
+          <p:nvPr/>
+        </p:nvSpPr>
+        <p:spPr>
+          <a:xfrm>
+            <a:off x="987552" y="4294632"/>
+            <a:ext cx="475488" cy="261610"/>
+          </a:xfrm>
+          <a:prstGeom prst="rect">
+            <a:avLst/>
+          </a:prstGeom>
+          <a:noFill/>
+        </p:spPr>
+        <p:txBody>
+          <a:bodyPr wrap="square" rtlCol="0">
+            <a:spAutoFit/>
+          </a:bodyPr>
+          <a:lstStyle/>
+          <a:p>
+            <a:r>
+              <a:rPr lang="en-US" sz="1100" dirty="0">
+                <a:latin typeface="Times New Roman" panose="02020603050405020304" pitchFamily="18" charset="0"/>
+                <a:cs typeface="Times New Roman" panose="02020603050405020304" pitchFamily="18" charset="0"/>
+              </a:rPr>
+              <a:t>295</a:t>
+            </a:r>
+          </a:p>
+        </p:txBody>
+      </p:sp>
+      <p:sp>
+        <p:nvSpPr>
+          <p:cNvPr id="23" name="TextBox 22">
+            <a:extLst>
+              <a:ext uri="{FF2B5EF4-FFF2-40B4-BE49-F238E27FC236}">
+                <a16:creationId xmlns:a16="http://schemas.microsoft.com/office/drawing/2014/main" id="{63B04B1E-6C50-7C62-DAFA-AC6766F29058}"/>
+              </a:ext>
+            </a:extLst>
+          </p:cNvPr>
+          <p:cNvSpPr txBox="1"/>
+          <p:nvPr/>
+        </p:nvSpPr>
+        <p:spPr>
+          <a:xfrm>
+            <a:off x="2301240" y="4294632"/>
+            <a:ext cx="475488" cy="261610"/>
+          </a:xfrm>
+          <a:prstGeom prst="rect">
+            <a:avLst/>
+          </a:prstGeom>
+          <a:noFill/>
+        </p:spPr>
+        <p:txBody>
+          <a:bodyPr wrap="square" rtlCol="0">
+            <a:spAutoFit/>
+          </a:bodyPr>
+          <a:lstStyle/>
+          <a:p>
+            <a:r>
+              <a:rPr lang="en-US" sz="1100" dirty="0">
+                <a:latin typeface="Times New Roman" panose="02020603050405020304" pitchFamily="18" charset="0"/>
+                <a:cs typeface="Times New Roman" panose="02020603050405020304" pitchFamily="18" charset="0"/>
+              </a:rPr>
+              <a:t>293</a:t>
+            </a:r>
+          </a:p>
+        </p:txBody>
+      </p:sp>
+      <p:sp>
+        <p:nvSpPr>
+          <p:cNvPr id="24" name="TextBox 23">
+            <a:extLst>
+              <a:ext uri="{FF2B5EF4-FFF2-40B4-BE49-F238E27FC236}">
+                <a16:creationId xmlns:a16="http://schemas.microsoft.com/office/drawing/2014/main" id="{5916DF85-646B-8EE3-4840-F30683980463}"/>
+              </a:ext>
+            </a:extLst>
+          </p:cNvPr>
+          <p:cNvSpPr txBox="1"/>
+          <p:nvPr/>
+        </p:nvSpPr>
+        <p:spPr>
+          <a:xfrm>
+            <a:off x="3544824" y="4294632"/>
+            <a:ext cx="475488" cy="261610"/>
+          </a:xfrm>
+          <a:prstGeom prst="rect">
+            <a:avLst/>
+          </a:prstGeom>
+          <a:noFill/>
+        </p:spPr>
+        <p:txBody>
+          <a:bodyPr wrap="square" rtlCol="0">
+            <a:spAutoFit/>
+          </a:bodyPr>
+          <a:lstStyle/>
+          <a:p>
+            <a:r>
+              <a:rPr lang="en-US" sz="1100" dirty="0">
+                <a:latin typeface="Times New Roman" panose="02020603050405020304" pitchFamily="18" charset="0"/>
+                <a:cs typeface="Times New Roman" panose="02020603050405020304" pitchFamily="18" charset="0"/>
+              </a:rPr>
+              <a:t>282</a:t>
+            </a:r>
+          </a:p>
+        </p:txBody>
+      </p:sp>
+      <p:sp>
+        <p:nvSpPr>
+          <p:cNvPr id="25" name="TextBox 24">
+            <a:extLst>
+              <a:ext uri="{FF2B5EF4-FFF2-40B4-BE49-F238E27FC236}">
+                <a16:creationId xmlns:a16="http://schemas.microsoft.com/office/drawing/2014/main" id="{436E1FAB-AA1C-114B-5687-2043C48A03E5}"/>
+              </a:ext>
+            </a:extLst>
+          </p:cNvPr>
+          <p:cNvSpPr txBox="1"/>
+          <p:nvPr/>
+        </p:nvSpPr>
+        <p:spPr>
+          <a:xfrm>
+            <a:off x="4835652" y="4294632"/>
+            <a:ext cx="475488" cy="261610"/>
+          </a:xfrm>
+          <a:prstGeom prst="rect">
+            <a:avLst/>
+          </a:prstGeom>
+          <a:noFill/>
+        </p:spPr>
+        <p:txBody>
+          <a:bodyPr wrap="square" rtlCol="0">
+            <a:spAutoFit/>
+          </a:bodyPr>
+          <a:lstStyle/>
+          <a:p>
+            <a:r>
+              <a:rPr lang="en-US" sz="1100" dirty="0">
+                <a:latin typeface="Times New Roman" panose="02020603050405020304" pitchFamily="18" charset="0"/>
+                <a:cs typeface="Times New Roman" panose="02020603050405020304" pitchFamily="18" charset="0"/>
+              </a:rPr>
+              <a:t>214</a:t>
+            </a:r>
+          </a:p>
+        </p:txBody>
+      </p:sp>
+      <p:sp>
+        <p:nvSpPr>
+          <p:cNvPr id="26" name="TextBox 25">
+            <a:extLst>
+              <a:ext uri="{FF2B5EF4-FFF2-40B4-BE49-F238E27FC236}">
+                <a16:creationId xmlns:a16="http://schemas.microsoft.com/office/drawing/2014/main" id="{23CBE8A1-2589-EAFB-62D0-BFD7816E52D9}"/>
+              </a:ext>
+            </a:extLst>
+          </p:cNvPr>
+          <p:cNvSpPr txBox="1"/>
+          <p:nvPr/>
+        </p:nvSpPr>
+        <p:spPr>
+          <a:xfrm>
+            <a:off x="6096000" y="4294632"/>
+            <a:ext cx="475488" cy="261610"/>
+          </a:xfrm>
+          <a:prstGeom prst="rect">
+            <a:avLst/>
+          </a:prstGeom>
+          <a:noFill/>
+        </p:spPr>
+        <p:txBody>
+          <a:bodyPr wrap="square" rtlCol="0">
+            <a:spAutoFit/>
+          </a:bodyPr>
+          <a:lstStyle/>
+          <a:p>
+            <a:r>
+              <a:rPr lang="en-US" sz="1100" dirty="0">
+                <a:latin typeface="Times New Roman" panose="02020603050405020304" pitchFamily="18" charset="0"/>
+                <a:cs typeface="Times New Roman" panose="02020603050405020304" pitchFamily="18" charset="0"/>
+              </a:rPr>
+              <a:t>130</a:t>
+            </a:r>
+          </a:p>
+        </p:txBody>
+      </p:sp>
+      <p:sp>
+        <p:nvSpPr>
+          <p:cNvPr id="27" name="TextBox 26">
+            <a:extLst>
+              <a:ext uri="{FF2B5EF4-FFF2-40B4-BE49-F238E27FC236}">
+                <a16:creationId xmlns:a16="http://schemas.microsoft.com/office/drawing/2014/main" id="{36D0264A-AEEF-1488-AE73-68F31521CBB7}"/>
+              </a:ext>
+            </a:extLst>
+          </p:cNvPr>
+          <p:cNvSpPr txBox="1"/>
+          <p:nvPr/>
+        </p:nvSpPr>
+        <p:spPr>
+          <a:xfrm>
+            <a:off x="7409688" y="4294632"/>
+            <a:ext cx="475488" cy="261610"/>
+          </a:xfrm>
+          <a:prstGeom prst="rect">
+            <a:avLst/>
+          </a:prstGeom>
+          <a:noFill/>
+        </p:spPr>
+        <p:txBody>
+          <a:bodyPr wrap="square" rtlCol="0">
+            <a:spAutoFit/>
+          </a:bodyPr>
+          <a:lstStyle/>
+          <a:p>
+            <a:r>
+              <a:rPr lang="en-US" sz="1100" dirty="0">
+                <a:latin typeface="Times New Roman" panose="02020603050405020304" pitchFamily="18" charset="0"/>
+                <a:cs typeface="Times New Roman" panose="02020603050405020304" pitchFamily="18" charset="0"/>
+              </a:rPr>
+              <a:t>106</a:t>
+            </a:r>
+          </a:p>
+        </p:txBody>
+      </p:sp>
+      <p:sp>
+        <p:nvSpPr>
+          <p:cNvPr id="28" name="TextBox 27">
+            <a:extLst>
+              <a:ext uri="{FF2B5EF4-FFF2-40B4-BE49-F238E27FC236}">
+                <a16:creationId xmlns:a16="http://schemas.microsoft.com/office/drawing/2014/main" id="{19A90873-B20A-E299-3069-585929A4FF0C}"/>
+              </a:ext>
+            </a:extLst>
+          </p:cNvPr>
+          <p:cNvSpPr txBox="1"/>
+          <p:nvPr/>
+        </p:nvSpPr>
+        <p:spPr>
+          <a:xfrm>
+            <a:off x="8653272" y="4294632"/>
+            <a:ext cx="475488" cy="261610"/>
+          </a:xfrm>
+          <a:prstGeom prst="rect">
+            <a:avLst/>
+          </a:prstGeom>
+          <a:noFill/>
+        </p:spPr>
+        <p:txBody>
+          <a:bodyPr wrap="square" rtlCol="0">
+            <a:spAutoFit/>
+          </a:bodyPr>
+          <a:lstStyle/>
+          <a:p>
+            <a:r>
+              <a:rPr lang="en-US" sz="1100" dirty="0">
+                <a:latin typeface="Times New Roman" panose="02020603050405020304" pitchFamily="18" charset="0"/>
+                <a:cs typeface="Times New Roman" panose="02020603050405020304" pitchFamily="18" charset="0"/>
+              </a:rPr>
+              <a:t>88</a:t>
+            </a:r>
+          </a:p>
+        </p:txBody>
+      </p:sp>
+      <p:sp>
+        <p:nvSpPr>
+          <p:cNvPr id="29" name="TextBox 28">
+            <a:extLst>
+              <a:ext uri="{FF2B5EF4-FFF2-40B4-BE49-F238E27FC236}">
+                <a16:creationId xmlns:a16="http://schemas.microsoft.com/office/drawing/2014/main" id="{F74D25BD-2990-55D2-9AAB-C347E3F6E190}"/>
+              </a:ext>
+            </a:extLst>
+          </p:cNvPr>
+          <p:cNvSpPr txBox="1"/>
+          <p:nvPr/>
+        </p:nvSpPr>
+        <p:spPr>
+          <a:xfrm>
+            <a:off x="9944100" y="4294632"/>
+            <a:ext cx="475488" cy="261610"/>
+          </a:xfrm>
+          <a:prstGeom prst="rect">
+            <a:avLst/>
+          </a:prstGeom>
+          <a:noFill/>
+        </p:spPr>
+        <p:txBody>
+          <a:bodyPr wrap="square" rtlCol="0">
+            <a:spAutoFit/>
+          </a:bodyPr>
+          <a:lstStyle/>
+          <a:p>
+            <a:r>
+              <a:rPr lang="en-US" sz="1100" dirty="0">
+                <a:latin typeface="Times New Roman" panose="02020603050405020304" pitchFamily="18" charset="0"/>
+                <a:cs typeface="Times New Roman" panose="02020603050405020304" pitchFamily="18" charset="0"/>
+              </a:rPr>
+              <a:t>104</a:t>
+            </a:r>
+          </a:p>
+        </p:txBody>
+      </p:sp>
+      <p:sp>
+        <p:nvSpPr>
+          <p:cNvPr id="32" name="TextBox 31">
+            <a:extLst>
+              <a:ext uri="{FF2B5EF4-FFF2-40B4-BE49-F238E27FC236}">
+                <a16:creationId xmlns:a16="http://schemas.microsoft.com/office/drawing/2014/main" id="{EC7C5D21-5C72-9688-7FC2-DD6DFB0D69E2}"/>
+              </a:ext>
+            </a:extLst>
+          </p:cNvPr>
+          <p:cNvSpPr txBox="1"/>
+          <p:nvPr/>
+        </p:nvSpPr>
+        <p:spPr>
+          <a:xfrm>
+            <a:off x="10562081" y="2697998"/>
+            <a:ext cx="1629918" cy="261610"/>
+          </a:xfrm>
+          <a:prstGeom prst="rect">
+            <a:avLst/>
+          </a:prstGeom>
+          <a:noFill/>
+        </p:spPr>
+        <p:txBody>
+          <a:bodyPr wrap="square" rtlCol="0">
+            <a:spAutoFit/>
+          </a:bodyPr>
+          <a:lstStyle/>
+          <a:p>
+            <a:r>
+              <a:rPr lang="en-US" sz="1100" dirty="0">
+                <a:latin typeface="Times New Roman" panose="02020603050405020304" pitchFamily="18" charset="0"/>
+                <a:cs typeface="Times New Roman" panose="02020603050405020304" pitchFamily="18" charset="0"/>
+              </a:rPr>
+              <a:t># Stems/Acre</a:t>
+            </a:r>
+          </a:p>
+        </p:txBody>
+      </p:sp>
+      <p:sp>
+        <p:nvSpPr>
+          <p:cNvPr id="33" name="TextBox 32">
+            <a:extLst>
+              <a:ext uri="{FF2B5EF4-FFF2-40B4-BE49-F238E27FC236}">
+                <a16:creationId xmlns:a16="http://schemas.microsoft.com/office/drawing/2014/main" id="{8BDC8128-A407-35F2-0CC0-5412976F5090}"/>
+              </a:ext>
+            </a:extLst>
+          </p:cNvPr>
+          <p:cNvSpPr txBox="1"/>
+          <p:nvPr/>
+        </p:nvSpPr>
+        <p:spPr>
+          <a:xfrm>
+            <a:off x="73152" y="1102852"/>
+            <a:ext cx="2935224" cy="369332"/>
+          </a:xfrm>
+          <a:prstGeom prst="rect">
+            <a:avLst/>
+          </a:prstGeom>
+          <a:solidFill>
+            <a:schemeClr val="bg1"/>
+          </a:solidFill>
+        </p:spPr>
+        <p:txBody>
+          <a:bodyPr wrap="square" rtlCol="0">
+            <a:spAutoFit/>
+          </a:bodyPr>
+          <a:lstStyle/>
+          <a:p>
+            <a:endParaRPr lang="en-US" dirty="0"/>
+          </a:p>
+        </p:txBody>
+      </p:sp>
+      <p:sp>
+        <p:nvSpPr>
+          <p:cNvPr id="34" name="TextBox 33">
+            <a:extLst>
+              <a:ext uri="{FF2B5EF4-FFF2-40B4-BE49-F238E27FC236}">
+                <a16:creationId xmlns:a16="http://schemas.microsoft.com/office/drawing/2014/main" id="{1AD267A2-F37A-3B8A-E44D-2FEC03F213EF}"/>
+              </a:ext>
+            </a:extLst>
+          </p:cNvPr>
+          <p:cNvSpPr txBox="1"/>
+          <p:nvPr/>
+        </p:nvSpPr>
+        <p:spPr>
+          <a:xfrm>
+            <a:off x="172592" y="1156713"/>
+            <a:ext cx="6421756" cy="369332"/>
+          </a:xfrm>
+          <a:prstGeom prst="rect">
+            <a:avLst/>
+          </a:prstGeom>
+          <a:noFill/>
+        </p:spPr>
+        <p:txBody>
+          <a:bodyPr wrap="square" rtlCol="0">
+            <a:spAutoFit/>
+          </a:bodyPr>
+          <a:lstStyle/>
+          <a:p>
+            <a:r>
+              <a:rPr lang="en-US" dirty="0">
+                <a:latin typeface="Times New Roman" panose="02020603050405020304" pitchFamily="18" charset="0"/>
+                <a:cs typeface="Times New Roman" panose="02020603050405020304" pitchFamily="18" charset="0"/>
+              </a:rPr>
+              <a:t>Saguaro NP PSME Plots Live Tree Species Composition Over Time</a:t>
             </a:r>
           </a:p>
         </p:txBody>
@@ -4619,7 +6514,7 @@
     </p:spTree>
     <p:extLst>
       <p:ext uri="{BB962C8B-B14F-4D97-AF65-F5344CB8AC3E}">
-        <p14:creationId xmlns:p14="http://schemas.microsoft.com/office/powerpoint/2010/main" val="311310059"/>
+        <p14:creationId xmlns:p14="http://schemas.microsoft.com/office/powerpoint/2010/main" val="1747748055"/>
       </p:ext>
     </p:extLst>
   </p:cSld>
@@ -4922,4 +6817,299 @@
     </a:ext>
   </a:extLst>
 </a:theme>
+</file>
+
+<file path=ppt/theme/theme2.xml><?xml version="1.0" encoding="utf-8"?>
+<a:theme xmlns:a="http://schemas.openxmlformats.org/drawingml/2006/main" name="Office Theme">
+  <a:themeElements>
+    <a:clrScheme name="Office">
+      <a:dk1>
+        <a:sysClr val="windowText" lastClr="000000"/>
+      </a:dk1>
+      <a:lt1>
+        <a:sysClr val="window" lastClr="FFFFFF"/>
+      </a:lt1>
+      <a:dk2>
+        <a:srgbClr val="44546A"/>
+      </a:dk2>
+      <a:lt2>
+        <a:srgbClr val="E7E6E6"/>
+      </a:lt2>
+      <a:accent1>
+        <a:srgbClr val="4472C4"/>
+      </a:accent1>
+      <a:accent2>
+        <a:srgbClr val="ED7D31"/>
+      </a:accent2>
+      <a:accent3>
+        <a:srgbClr val="A5A5A5"/>
+      </a:accent3>
+      <a:accent4>
+        <a:srgbClr val="FFC000"/>
+      </a:accent4>
+      <a:accent5>
+        <a:srgbClr val="5B9BD5"/>
+      </a:accent5>
+      <a:accent6>
+        <a:srgbClr val="70AD47"/>
+      </a:accent6>
+      <a:hlink>
+        <a:srgbClr val="0563C1"/>
+      </a:hlink>
+      <a:folHlink>
+        <a:srgbClr val="954F72"/>
+      </a:folHlink>
+    </a:clrScheme>
+    <a:fontScheme name="Office">
+      <a:majorFont>
+        <a:latin typeface="Calibri Light" panose="020F0302020204030204"/>
+        <a:ea typeface=""/>
+        <a:cs typeface=""/>
+        <a:font script="Jpan" typeface="游ゴシック Light"/>
+        <a:font script="Hang" typeface="맑은 고딕"/>
+        <a:font script="Hans" typeface="等线 Light"/>
+        <a:font script="Hant" typeface="新細明體"/>
+        <a:font script="Arab" typeface="Times New Roman"/>
+        <a:font script="Hebr" typeface="Times New Roman"/>
+        <a:font script="Thai" typeface="Angsana New"/>
+        <a:font script="Ethi" typeface="Nyala"/>
+        <a:font script="Beng" typeface="Vrinda"/>
+        <a:font script="Gujr" typeface="Shruti"/>
+        <a:font script="Khmr" typeface="MoolBoran"/>
+        <a:font script="Knda" typeface="Tunga"/>
+        <a:font script="Guru" typeface="Raavi"/>
+        <a:font script="Cans" typeface="Euphemia"/>
+        <a:font script="Cher" typeface="Plantagenet Cherokee"/>
+        <a:font script="Yiii" typeface="Microsoft Yi Baiti"/>
+        <a:font script="Tibt" typeface="Microsoft Himalaya"/>
+        <a:font script="Thaa" typeface="MV Boli"/>
+        <a:font script="Deva" typeface="Mangal"/>
+        <a:font script="Telu" typeface="Gautami"/>
+        <a:font script="Taml" typeface="Latha"/>
+        <a:font script="Syrc" typeface="Estrangelo Edessa"/>
+        <a:font script="Orya" typeface="Kalinga"/>
+        <a:font script="Mlym" typeface="Kartika"/>
+        <a:font script="Laoo" typeface="DokChampa"/>
+        <a:font script="Sinh" typeface="Iskoola Pota"/>
+        <a:font script="Mong" typeface="Mongolian Baiti"/>
+        <a:font script="Viet" typeface="Times New Roman"/>
+        <a:font script="Uigh" typeface="Microsoft Uighur"/>
+        <a:font script="Geor" typeface="Sylfaen"/>
+        <a:font script="Armn" typeface="Arial"/>
+        <a:font script="Bugi" typeface="Leelawadee UI"/>
+        <a:font script="Bopo" typeface="Microsoft JhengHei"/>
+        <a:font script="Java" typeface="Javanese Text"/>
+        <a:font script="Lisu" typeface="Segoe UI"/>
+        <a:font script="Mymr" typeface="Myanmar Text"/>
+        <a:font script="Nkoo" typeface="Ebrima"/>
+        <a:font script="Olck" typeface="Nirmala UI"/>
+        <a:font script="Osma" typeface="Ebrima"/>
+        <a:font script="Phag" typeface="Phagspa"/>
+        <a:font script="Syrn" typeface="Estrangelo Edessa"/>
+        <a:font script="Syrj" typeface="Estrangelo Edessa"/>
+        <a:font script="Syre" typeface="Estrangelo Edessa"/>
+        <a:font script="Sora" typeface="Nirmala UI"/>
+        <a:font script="Tale" typeface="Microsoft Tai Le"/>
+        <a:font script="Talu" typeface="Microsoft New Tai Lue"/>
+        <a:font script="Tfng" typeface="Ebrima"/>
+      </a:majorFont>
+      <a:minorFont>
+        <a:latin typeface="Calibri" panose="020F0502020204030204"/>
+        <a:ea typeface=""/>
+        <a:cs typeface=""/>
+        <a:font script="Jpan" typeface="游ゴシック"/>
+        <a:font script="Hang" typeface="맑은 고딕"/>
+        <a:font script="Hans" typeface="等线"/>
+        <a:font script="Hant" typeface="新細明體"/>
+        <a:font script="Arab" typeface="Arial"/>
+        <a:font script="Hebr" typeface="Arial"/>
+        <a:font script="Thai" typeface="Cordia New"/>
+        <a:font script="Ethi" typeface="Nyala"/>
+        <a:font script="Beng" typeface="Vrinda"/>
+        <a:font script="Gujr" typeface="Shruti"/>
+        <a:font script="Khmr" typeface="DaunPenh"/>
+        <a:font script="Knda" typeface="Tunga"/>
+        <a:font script="Guru" typeface="Raavi"/>
+        <a:font script="Cans" typeface="Euphemia"/>
+        <a:font script="Cher" typeface="Plantagenet Cherokee"/>
+        <a:font script="Yiii" typeface="Microsoft Yi Baiti"/>
+        <a:font script="Tibt" typeface="Microsoft Himalaya"/>
+        <a:font script="Thaa" typeface="MV Boli"/>
+        <a:font script="Deva" typeface="Mangal"/>
+        <a:font script="Telu" typeface="Gautami"/>
+        <a:font script="Taml" typeface="Latha"/>
+        <a:font script="Syrc" typeface="Estrangelo Edessa"/>
+        <a:font script="Orya" typeface="Kalinga"/>
+        <a:font script="Mlym" typeface="Kartika"/>
+        <a:font script="Laoo" typeface="DokChampa"/>
+        <a:font script="Sinh" typeface="Iskoola Pota"/>
+        <a:font script="Mong" typeface="Mongolian Baiti"/>
+        <a:font script="Viet" typeface="Arial"/>
+        <a:font script="Uigh" typeface="Microsoft Uighur"/>
+        <a:font script="Geor" typeface="Sylfaen"/>
+        <a:font script="Armn" typeface="Arial"/>
+        <a:font script="Bugi" typeface="Leelawadee UI"/>
+        <a:font script="Bopo" typeface="Microsoft JhengHei"/>
+        <a:font script="Java" typeface="Javanese Text"/>
+        <a:font script="Lisu" typeface="Segoe UI"/>
+        <a:font script="Mymr" typeface="Myanmar Text"/>
+        <a:font script="Nkoo" typeface="Ebrima"/>
+        <a:font script="Olck" typeface="Nirmala UI"/>
+        <a:font script="Osma" typeface="Ebrima"/>
+        <a:font script="Phag" typeface="Phagspa"/>
+        <a:font script="Syrn" typeface="Estrangelo Edessa"/>
+        <a:font script="Syrj" typeface="Estrangelo Edessa"/>
+        <a:font script="Syre" typeface="Estrangelo Edessa"/>
+        <a:font script="Sora" typeface="Nirmala UI"/>
+        <a:font script="Tale" typeface="Microsoft Tai Le"/>
+        <a:font script="Talu" typeface="Microsoft New Tai Lue"/>
+        <a:font script="Tfng" typeface="Ebrima"/>
+      </a:minorFont>
+    </a:fontScheme>
+    <a:fmtScheme name="Office">
+      <a:fillStyleLst>
+        <a:solidFill>
+          <a:schemeClr val="phClr"/>
+        </a:solidFill>
+        <a:gradFill rotWithShape="1">
+          <a:gsLst>
+            <a:gs pos="0">
+              <a:schemeClr val="phClr">
+                <a:lumMod val="110000"/>
+                <a:satMod val="105000"/>
+                <a:tint val="67000"/>
+              </a:schemeClr>
+            </a:gs>
+            <a:gs pos="50000">
+              <a:schemeClr val="phClr">
+                <a:lumMod val="105000"/>
+                <a:satMod val="103000"/>
+                <a:tint val="73000"/>
+              </a:schemeClr>
+            </a:gs>
+            <a:gs pos="100000">
+              <a:schemeClr val="phClr">
+                <a:lumMod val="105000"/>
+                <a:satMod val="109000"/>
+                <a:tint val="81000"/>
+              </a:schemeClr>
+            </a:gs>
+          </a:gsLst>
+          <a:lin ang="5400000" scaled="0"/>
+        </a:gradFill>
+        <a:gradFill rotWithShape="1">
+          <a:gsLst>
+            <a:gs pos="0">
+              <a:schemeClr val="phClr">
+                <a:satMod val="103000"/>
+                <a:lumMod val="102000"/>
+                <a:tint val="94000"/>
+              </a:schemeClr>
+            </a:gs>
+            <a:gs pos="50000">
+              <a:schemeClr val="phClr">
+                <a:satMod val="110000"/>
+                <a:lumMod val="100000"/>
+                <a:shade val="100000"/>
+              </a:schemeClr>
+            </a:gs>
+            <a:gs pos="100000">
+              <a:schemeClr val="phClr">
+                <a:lumMod val="99000"/>
+                <a:satMod val="120000"/>
+                <a:shade val="78000"/>
+              </a:schemeClr>
+            </a:gs>
+          </a:gsLst>
+          <a:lin ang="5400000" scaled="0"/>
+        </a:gradFill>
+      </a:fillStyleLst>
+      <a:lnStyleLst>
+        <a:ln w="6350" cap="flat" cmpd="sng" algn="ctr">
+          <a:solidFill>
+            <a:schemeClr val="phClr"/>
+          </a:solidFill>
+          <a:prstDash val="solid"/>
+          <a:miter lim="800000"/>
+        </a:ln>
+        <a:ln w="12700" cap="flat" cmpd="sng" algn="ctr">
+          <a:solidFill>
+            <a:schemeClr val="phClr"/>
+          </a:solidFill>
+          <a:prstDash val="solid"/>
+          <a:miter lim="800000"/>
+        </a:ln>
+        <a:ln w="19050" cap="flat" cmpd="sng" algn="ctr">
+          <a:solidFill>
+            <a:schemeClr val="phClr"/>
+          </a:solidFill>
+          <a:prstDash val="solid"/>
+          <a:miter lim="800000"/>
+        </a:ln>
+      </a:lnStyleLst>
+      <a:effectStyleLst>
+        <a:effectStyle>
+          <a:effectLst/>
+        </a:effectStyle>
+        <a:effectStyle>
+          <a:effectLst/>
+        </a:effectStyle>
+        <a:effectStyle>
+          <a:effectLst>
+            <a:outerShdw blurRad="57150" dist="19050" dir="5400000" algn="ctr" rotWithShape="0">
+              <a:srgbClr val="000000">
+                <a:alpha val="63000"/>
+              </a:srgbClr>
+            </a:outerShdw>
+          </a:effectLst>
+        </a:effectStyle>
+      </a:effectStyleLst>
+      <a:bgFillStyleLst>
+        <a:solidFill>
+          <a:schemeClr val="phClr"/>
+        </a:solidFill>
+        <a:solidFill>
+          <a:schemeClr val="phClr">
+            <a:tint val="95000"/>
+            <a:satMod val="170000"/>
+          </a:schemeClr>
+        </a:solidFill>
+        <a:gradFill rotWithShape="1">
+          <a:gsLst>
+            <a:gs pos="0">
+              <a:schemeClr val="phClr">
+                <a:tint val="93000"/>
+                <a:satMod val="150000"/>
+                <a:shade val="98000"/>
+                <a:lumMod val="102000"/>
+              </a:schemeClr>
+            </a:gs>
+            <a:gs pos="50000">
+              <a:schemeClr val="phClr">
+                <a:tint val="98000"/>
+                <a:satMod val="130000"/>
+                <a:shade val="90000"/>
+                <a:lumMod val="103000"/>
+              </a:schemeClr>
+            </a:gs>
+            <a:gs pos="100000">
+              <a:schemeClr val="phClr">
+                <a:shade val="63000"/>
+                <a:satMod val="120000"/>
+              </a:schemeClr>
+            </a:gs>
+          </a:gsLst>
+          <a:lin ang="5400000" scaled="0"/>
+        </a:gradFill>
+      </a:bgFillStyleLst>
+    </a:fmtScheme>
+  </a:themeElements>
+  <a:objectDefaults/>
+  <a:extraClrSchemeLst/>
+  <a:extLst>
+    <a:ext uri="{05A4C25C-085E-4340-85A3-A5531E510DB2}">
+      <thm15:themeFamily xmlns:thm15="http://schemas.microsoft.com/office/thememl/2012/main" name="Office Theme" id="{62F939B6-93AF-4DB8-9C6B-D6C7DFDC589F}" vid="{4A3C46E8-61CC-4603-A589-7422A47A8E4A}"/>
+    </a:ext>
+  </a:extLst>
+</a:theme>
 </file>
</xml_diff>

<commit_message>
created a project for FFIanalysis
</commit_message>
<xml_diff>
--- a/Analysis/PSME_Plots/Presentation1.pptx
+++ b/Analysis/PSME_Plots/Presentation1.pptx
@@ -119,7 +119,7 @@
 <file path=ppt/revisionInfo.xml><?xml version="1.0" encoding="utf-8"?>
 <p1510:revInfo xmlns:a="http://schemas.openxmlformats.org/drawingml/2006/main" xmlns:r="http://schemas.openxmlformats.org/officeDocument/2006/relationships" xmlns:p1510="http://schemas.microsoft.com/office/powerpoint/2015/10/main">
   <p1510:revLst>
-    <p1510:client id="{F3422DEB-6D8F-4738-A511-A3AFCDF5708E}" v="36" dt="2024-05-24T23:18:50.739"/>
+    <p1510:client id="{F3422DEB-6D8F-4738-A511-A3AFCDF5708E}" v="37" dt="2024-06-11T21:27:32.749"/>
   </p1510:revLst>
 </p1510:revInfo>
 </file>
@@ -177,12 +177,12 @@
   <pc:docChgLst>
     <pc:chgData name="Deegan, Eva S" userId="ae3b14c2-f29a-4e9c-95fa-aa21238c8fd4" providerId="ADAL" clId="{F3422DEB-6D8F-4738-A511-A3AFCDF5708E}"/>
     <pc:docChg chg="undo custSel addSld delSld modSld sldOrd">
-      <pc:chgData name="Deegan, Eva S" userId="ae3b14c2-f29a-4e9c-95fa-aa21238c8fd4" providerId="ADAL" clId="{F3422DEB-6D8F-4738-A511-A3AFCDF5708E}" dt="2024-05-24T23:18:50.739" v="259"/>
+      <pc:chgData name="Deegan, Eva S" userId="ae3b14c2-f29a-4e9c-95fa-aa21238c8fd4" providerId="ADAL" clId="{F3422DEB-6D8F-4738-A511-A3AFCDF5708E}" dt="2024-06-11T21:27:32.747" v="260" actId="14826"/>
       <pc:docMkLst>
         <pc:docMk/>
       </pc:docMkLst>
       <pc:sldChg chg="addSp delSp modSp mod modTransition modNotesTx">
-        <pc:chgData name="Deegan, Eva S" userId="ae3b14c2-f29a-4e9c-95fa-aa21238c8fd4" providerId="ADAL" clId="{F3422DEB-6D8F-4738-A511-A3AFCDF5708E}" dt="2024-05-24T23:18:50.739" v="259"/>
+        <pc:chgData name="Deegan, Eva S" userId="ae3b14c2-f29a-4e9c-95fa-aa21238c8fd4" providerId="ADAL" clId="{F3422DEB-6D8F-4738-A511-A3AFCDF5708E}" dt="2024-06-11T21:27:32.747" v="260" actId="14826"/>
         <pc:sldMkLst>
           <pc:docMk/>
           <pc:sldMk cId="3069914526" sldId="256"/>
@@ -212,7 +212,7 @@
           </ac:spMkLst>
         </pc:spChg>
         <pc:picChg chg="mod">
-          <ac:chgData name="Deegan, Eva S" userId="ae3b14c2-f29a-4e9c-95fa-aa21238c8fd4" providerId="ADAL" clId="{F3422DEB-6D8F-4738-A511-A3AFCDF5708E}" dt="2024-05-24T21:57:58.618" v="64" actId="14826"/>
+          <ac:chgData name="Deegan, Eva S" userId="ae3b14c2-f29a-4e9c-95fa-aa21238c8fd4" providerId="ADAL" clId="{F3422DEB-6D8F-4738-A511-A3AFCDF5708E}" dt="2024-06-11T21:27:32.747" v="260" actId="14826"/>
           <ac:picMkLst>
             <pc:docMk/>
             <pc:sldMk cId="3069914526" sldId="256"/>
@@ -711,7 +711,7 @@
           <a:p>
             <a:fld id="{C61AEEE9-9F64-4F78-B32F-FECBCCEB864F}" type="datetimeFigureOut">
               <a:rPr lang="en-US" smtClean="0"/>
-              <a:t>5/24/2024</a:t>
+              <a:t>6/11/2024</a:t>
             </a:fld>
             <a:endParaRPr lang="en-US"/>
           </a:p>
@@ -1299,7 +1299,7 @@
           <a:p>
             <a:fld id="{15541A1B-5136-478E-A332-07FC643323C2}" type="datetimeFigureOut">
               <a:rPr lang="en-US" smtClean="0"/>
-              <a:t>5/23/2024</a:t>
+              <a:t>6/11/2024</a:t>
             </a:fld>
             <a:endParaRPr lang="en-US"/>
           </a:p>
@@ -1497,7 +1497,7 @@
           <a:p>
             <a:fld id="{15541A1B-5136-478E-A332-07FC643323C2}" type="datetimeFigureOut">
               <a:rPr lang="en-US" smtClean="0"/>
-              <a:t>5/23/2024</a:t>
+              <a:t>6/11/2024</a:t>
             </a:fld>
             <a:endParaRPr lang="en-US"/>
           </a:p>
@@ -1705,7 +1705,7 @@
           <a:p>
             <a:fld id="{15541A1B-5136-478E-A332-07FC643323C2}" type="datetimeFigureOut">
               <a:rPr lang="en-US" smtClean="0"/>
-              <a:t>5/23/2024</a:t>
+              <a:t>6/11/2024</a:t>
             </a:fld>
             <a:endParaRPr lang="en-US"/>
           </a:p>
@@ -1903,7 +1903,7 @@
           <a:p>
             <a:fld id="{15541A1B-5136-478E-A332-07FC643323C2}" type="datetimeFigureOut">
               <a:rPr lang="en-US" smtClean="0"/>
-              <a:t>5/23/2024</a:t>
+              <a:t>6/11/2024</a:t>
             </a:fld>
             <a:endParaRPr lang="en-US"/>
           </a:p>
@@ -2178,7 +2178,7 @@
           <a:p>
             <a:fld id="{15541A1B-5136-478E-A332-07FC643323C2}" type="datetimeFigureOut">
               <a:rPr lang="en-US" smtClean="0"/>
-              <a:t>5/23/2024</a:t>
+              <a:t>6/11/2024</a:t>
             </a:fld>
             <a:endParaRPr lang="en-US"/>
           </a:p>
@@ -2443,7 +2443,7 @@
           <a:p>
             <a:fld id="{15541A1B-5136-478E-A332-07FC643323C2}" type="datetimeFigureOut">
               <a:rPr lang="en-US" smtClean="0"/>
-              <a:t>5/23/2024</a:t>
+              <a:t>6/11/2024</a:t>
             </a:fld>
             <a:endParaRPr lang="en-US"/>
           </a:p>
@@ -2855,7 +2855,7 @@
           <a:p>
             <a:fld id="{15541A1B-5136-478E-A332-07FC643323C2}" type="datetimeFigureOut">
               <a:rPr lang="en-US" smtClean="0"/>
-              <a:t>5/23/2024</a:t>
+              <a:t>6/11/2024</a:t>
             </a:fld>
             <a:endParaRPr lang="en-US"/>
           </a:p>
@@ -2996,7 +2996,7 @@
           <a:p>
             <a:fld id="{15541A1B-5136-478E-A332-07FC643323C2}" type="datetimeFigureOut">
               <a:rPr lang="en-US" smtClean="0"/>
-              <a:t>5/23/2024</a:t>
+              <a:t>6/11/2024</a:t>
             </a:fld>
             <a:endParaRPr lang="en-US"/>
           </a:p>
@@ -3109,7 +3109,7 @@
           <a:p>
             <a:fld id="{15541A1B-5136-478E-A332-07FC643323C2}" type="datetimeFigureOut">
               <a:rPr lang="en-US" smtClean="0"/>
-              <a:t>5/23/2024</a:t>
+              <a:t>6/11/2024</a:t>
             </a:fld>
             <a:endParaRPr lang="en-US"/>
           </a:p>
@@ -3420,7 +3420,7 @@
           <a:p>
             <a:fld id="{15541A1B-5136-478E-A332-07FC643323C2}" type="datetimeFigureOut">
               <a:rPr lang="en-US" smtClean="0"/>
-              <a:t>5/23/2024</a:t>
+              <a:t>6/11/2024</a:t>
             </a:fld>
             <a:endParaRPr lang="en-US"/>
           </a:p>
@@ -3708,7 +3708,7 @@
           <a:p>
             <a:fld id="{15541A1B-5136-478E-A332-07FC643323C2}" type="datetimeFigureOut">
               <a:rPr lang="en-US" smtClean="0"/>
-              <a:t>5/23/2024</a:t>
+              <a:t>6/11/2024</a:t>
             </a:fld>
             <a:endParaRPr lang="en-US"/>
           </a:p>
@@ -3949,7 +3949,7 @@
           <a:p>
             <a:fld id="{15541A1B-5136-478E-A332-07FC643323C2}" type="datetimeFigureOut">
               <a:rPr lang="en-US" smtClean="0"/>
-              <a:t>5/23/2024</a:t>
+              <a:t>6/11/2024</a:t>
             </a:fld>
             <a:endParaRPr lang="en-US"/>
           </a:p>
@@ -4368,7 +4368,7 @@
       </p:grpSpPr>
       <p:pic>
         <p:nvPicPr>
-          <p:cNvPr id="5" name="Picture 4" descr="A picture containing diagram&#10;&#10;Description automatically generated">
+          <p:cNvPr id="5" name="Picture 4">
             <a:extLst>
               <a:ext uri="{FF2B5EF4-FFF2-40B4-BE49-F238E27FC236}">
                 <a16:creationId xmlns:a16="http://schemas.microsoft.com/office/drawing/2014/main" id="{22982135-07CD-1E91-01C0-C6AB3B4B4FC8}"/>
@@ -4388,14 +4388,13 @@
               </a:ext>
             </a:extLst>
           </a:blip>
-          <a:stretch>
-            <a:fillRect/>
-          </a:stretch>
+          <a:srcRect/>
+          <a:stretch/>
         </p:blipFill>
         <p:spPr>
           <a:xfrm>
             <a:off x="0" y="177800"/>
-            <a:ext cx="12192000" cy="6502400"/>
+            <a:ext cx="12191999" cy="6502400"/>
           </a:xfrm>
           <a:prstGeom prst="rect">
             <a:avLst/>

</xml_diff>